<commit_message>
Finished the final report
</commit_message>
<xml_diff>
--- a/reports/Capstone-2.pptx
+++ b/reports/Capstone-2.pptx
@@ -130,6 +130,9 @@
     <p:ext uri="{EFAFB233-063F-42B5-8137-9DF3F51BA10A}">
       <p15:sldGuideLst xmlns:p15="http://schemas.microsoft.com/office/powerpoint/2012/main"/>
     </p:ext>
+    <p:ext uri="{2D200454-40CA-4A62-9FC3-DE9A4176ACB9}">
+      <p15:notesGuideLst xmlns:p15="http://schemas.microsoft.com/office/powerpoint/2012/main"/>
+    </p:ext>
   </p:extLst>
 </p:presentation>
 </file>
@@ -140,1561 +143,6 @@
     <p1510:client id="{3DDDD3D5-768F-4329-835D-C3D8D568ECA8}" v="77" dt="2023-06-08T15:24:52.467"/>
   </p1510:revLst>
 </p1510:revInfo>
-</file>
-
-<file path=ppt/changesInfos/changesInfo1.xml><?xml version="1.0" encoding="utf-8"?>
-<pc:chgInfo xmlns:a="http://schemas.openxmlformats.org/drawingml/2006/main" xmlns:r="http://schemas.openxmlformats.org/officeDocument/2006/relationships" xmlns:ac="http://schemas.microsoft.com/office/drawing/2013/main/command" xmlns:pc="http://schemas.microsoft.com/office/powerpoint/2013/main/command">
-  <pc:docChgLst>
-    <pc:chgData name="Judah Drelich" userId="b58a0b8387fae8c8" providerId="LiveId" clId="{3DDDD3D5-768F-4329-835D-C3D8D568ECA8}"/>
-    <pc:docChg chg="undo custSel addSld delSld modSld sldOrd">
-      <pc:chgData name="Judah Drelich" userId="b58a0b8387fae8c8" providerId="LiveId" clId="{3DDDD3D5-768F-4329-835D-C3D8D568ECA8}" dt="2023-06-08T15:48:21.616" v="3771" actId="20577"/>
-      <pc:docMkLst>
-        <pc:docMk/>
-      </pc:docMkLst>
-      <pc:sldChg chg="addSp delSp modSp mod addAnim setClrOvrMap delDesignElem">
-        <pc:chgData name="Judah Drelich" userId="b58a0b8387fae8c8" providerId="LiveId" clId="{3DDDD3D5-768F-4329-835D-C3D8D568ECA8}" dt="2023-06-07T21:01:44.556" v="26" actId="26606"/>
-        <pc:sldMkLst>
-          <pc:docMk/>
-          <pc:sldMk cId="299978964" sldId="256"/>
-        </pc:sldMkLst>
-        <pc:spChg chg="mod">
-          <ac:chgData name="Judah Drelich" userId="b58a0b8387fae8c8" providerId="LiveId" clId="{3DDDD3D5-768F-4329-835D-C3D8D568ECA8}" dt="2023-06-07T21:01:44.556" v="26" actId="26606"/>
-          <ac:spMkLst>
-            <pc:docMk/>
-            <pc:sldMk cId="299978964" sldId="256"/>
-            <ac:spMk id="2" creationId="{B17B7055-4028-86AB-2621-63807C96CF29}"/>
-          </ac:spMkLst>
-        </pc:spChg>
-        <pc:spChg chg="mod">
-          <ac:chgData name="Judah Drelich" userId="b58a0b8387fae8c8" providerId="LiveId" clId="{3DDDD3D5-768F-4329-835D-C3D8D568ECA8}" dt="2023-06-07T21:01:44.556" v="26" actId="26606"/>
-          <ac:spMkLst>
-            <pc:docMk/>
-            <pc:sldMk cId="299978964" sldId="256"/>
-            <ac:spMk id="3" creationId="{F44E998A-4764-68A7-E0C1-3415F76F0D85}"/>
-          </ac:spMkLst>
-        </pc:spChg>
-        <pc:spChg chg="mod">
-          <ac:chgData name="Judah Drelich" userId="b58a0b8387fae8c8" providerId="LiveId" clId="{3DDDD3D5-768F-4329-835D-C3D8D568ECA8}" dt="2023-06-07T21:01:44.556" v="26" actId="26606"/>
-          <ac:spMkLst>
-            <pc:docMk/>
-            <pc:sldMk cId="299978964" sldId="256"/>
-            <ac:spMk id="7" creationId="{C3623DE1-80EB-83D4-062C-3245316D286B}"/>
-          </ac:spMkLst>
-        </pc:spChg>
-        <pc:spChg chg="add del">
-          <ac:chgData name="Judah Drelich" userId="b58a0b8387fae8c8" providerId="LiveId" clId="{3DDDD3D5-768F-4329-835D-C3D8D568ECA8}" dt="2023-06-07T21:01:05.984" v="21" actId="26606"/>
-          <ac:spMkLst>
-            <pc:docMk/>
-            <pc:sldMk cId="299978964" sldId="256"/>
-            <ac:spMk id="9" creationId="{0671A8AE-40A1-4631-A6B8-581AFF065482}"/>
-          </ac:spMkLst>
-        </pc:spChg>
-        <pc:spChg chg="add del">
-          <ac:chgData name="Judah Drelich" userId="b58a0b8387fae8c8" providerId="LiveId" clId="{3DDDD3D5-768F-4329-835D-C3D8D568ECA8}" dt="2023-06-07T21:01:05.984" v="21" actId="26606"/>
-          <ac:spMkLst>
-            <pc:docMk/>
-            <pc:sldMk cId="299978964" sldId="256"/>
-            <ac:spMk id="10" creationId="{AB58EF07-17C2-48CF-ABB0-EEF1F17CB8F0}"/>
-          </ac:spMkLst>
-        </pc:spChg>
-        <pc:spChg chg="add del">
-          <ac:chgData name="Judah Drelich" userId="b58a0b8387fae8c8" providerId="LiveId" clId="{3DDDD3D5-768F-4329-835D-C3D8D568ECA8}" dt="2023-06-07T21:01:05.984" v="21" actId="26606"/>
-          <ac:spMkLst>
-            <pc:docMk/>
-            <pc:sldMk cId="299978964" sldId="256"/>
-            <ac:spMk id="11" creationId="{AF2F604E-43BE-4DC3-B983-E071523364F8}"/>
-          </ac:spMkLst>
-        </pc:spChg>
-        <pc:spChg chg="add del">
-          <ac:chgData name="Judah Drelich" userId="b58a0b8387fae8c8" providerId="LiveId" clId="{3DDDD3D5-768F-4329-835D-C3D8D568ECA8}" dt="2023-06-07T20:59:24.687" v="12" actId="26606"/>
-          <ac:spMkLst>
-            <pc:docMk/>
-            <pc:sldMk cId="299978964" sldId="256"/>
-            <ac:spMk id="12" creationId="{D3F794D0-2982-490E-88DA-93D48975085F}"/>
-          </ac:spMkLst>
-        </pc:spChg>
-        <pc:spChg chg="add del">
-          <ac:chgData name="Judah Drelich" userId="b58a0b8387fae8c8" providerId="LiveId" clId="{3DDDD3D5-768F-4329-835D-C3D8D568ECA8}" dt="2023-06-07T21:01:05.984" v="21" actId="26606"/>
-          <ac:spMkLst>
-            <pc:docMk/>
-            <pc:sldMk cId="299978964" sldId="256"/>
-            <ac:spMk id="13" creationId="{08C9B587-E65E-4B52-B37C-ABEBB6E87928}"/>
-          </ac:spMkLst>
-        </pc:spChg>
-        <pc:spChg chg="add del">
-          <ac:chgData name="Judah Drelich" userId="b58a0b8387fae8c8" providerId="LiveId" clId="{3DDDD3D5-768F-4329-835D-C3D8D568ECA8}" dt="2023-06-07T20:59:24.687" v="12" actId="26606"/>
-          <ac:spMkLst>
-            <pc:docMk/>
-            <pc:sldMk cId="299978964" sldId="256"/>
-            <ac:spMk id="14" creationId="{AFD24A3D-F07A-44A9-BE55-5576292E152D}"/>
-          </ac:spMkLst>
-        </pc:spChg>
-        <pc:spChg chg="add del">
-          <ac:chgData name="Judah Drelich" userId="b58a0b8387fae8c8" providerId="LiveId" clId="{3DDDD3D5-768F-4329-835D-C3D8D568ECA8}" dt="2023-06-07T21:01:06.895" v="23" actId="26606"/>
-          <ac:spMkLst>
-            <pc:docMk/>
-            <pc:sldMk cId="299978964" sldId="256"/>
-            <ac:spMk id="15" creationId="{0E91F5CA-B392-444C-88E3-BF5BAAEBDEB0}"/>
-          </ac:spMkLst>
-        </pc:spChg>
-        <pc:spChg chg="add del">
-          <ac:chgData name="Judah Drelich" userId="b58a0b8387fae8c8" providerId="LiveId" clId="{3DDDD3D5-768F-4329-835D-C3D8D568ECA8}" dt="2023-06-07T20:59:24.687" v="12" actId="26606"/>
-          <ac:spMkLst>
-            <pc:docMk/>
-            <pc:sldMk cId="299978964" sldId="256"/>
-            <ac:spMk id="16" creationId="{204441C9-FD2D-4031-B5C5-67478196CCCF}"/>
-          </ac:spMkLst>
-        </pc:spChg>
-        <pc:spChg chg="add del">
-          <ac:chgData name="Judah Drelich" userId="b58a0b8387fae8c8" providerId="LiveId" clId="{3DDDD3D5-768F-4329-835D-C3D8D568ECA8}" dt="2023-06-07T20:59:24.687" v="12" actId="26606"/>
-          <ac:spMkLst>
-            <pc:docMk/>
-            <pc:sldMk cId="299978964" sldId="256"/>
-            <ac:spMk id="18" creationId="{EBF09AEC-6E6E-418F-9974-8730F1B2B6EF}"/>
-          </ac:spMkLst>
-        </pc:spChg>
-        <pc:spChg chg="add del">
-          <ac:chgData name="Judah Drelich" userId="b58a0b8387fae8c8" providerId="LiveId" clId="{3DDDD3D5-768F-4329-835D-C3D8D568ECA8}" dt="2023-06-07T21:01:06.895" v="23" actId="26606"/>
-          <ac:spMkLst>
-            <pc:docMk/>
-            <pc:sldMk cId="299978964" sldId="256"/>
-            <ac:spMk id="19" creationId="{DFCA2118-59A2-4310-A4B2-F2CBA821E842}"/>
-          </ac:spMkLst>
-        </pc:spChg>
-        <pc:spChg chg="add del">
-          <ac:chgData name="Judah Drelich" userId="b58a0b8387fae8c8" providerId="LiveId" clId="{3DDDD3D5-768F-4329-835D-C3D8D568ECA8}" dt="2023-06-07T20:59:24.687" v="12" actId="26606"/>
-          <ac:spMkLst>
-            <pc:docMk/>
-            <pc:sldMk cId="299978964" sldId="256"/>
-            <ac:spMk id="20" creationId="{3D9D3989-3E00-4727-914E-959DFE8FACE9}"/>
-          </ac:spMkLst>
-        </pc:spChg>
-        <pc:spChg chg="add del">
-          <ac:chgData name="Judah Drelich" userId="b58a0b8387fae8c8" providerId="LiveId" clId="{3DDDD3D5-768F-4329-835D-C3D8D568ECA8}" dt="2023-06-07T21:01:44.541" v="25" actId="26606"/>
-          <ac:spMkLst>
-            <pc:docMk/>
-            <pc:sldMk cId="299978964" sldId="256"/>
-            <ac:spMk id="21" creationId="{9C6777B5-64F4-4200-B099-34168B69FE53}"/>
-          </ac:spMkLst>
-        </pc:spChg>
-        <pc:spChg chg="add del">
-          <ac:chgData name="Judah Drelich" userId="b58a0b8387fae8c8" providerId="LiveId" clId="{3DDDD3D5-768F-4329-835D-C3D8D568ECA8}" dt="2023-06-07T21:01:44.541" v="25" actId="26606"/>
-          <ac:spMkLst>
-            <pc:docMk/>
-            <pc:sldMk cId="299978964" sldId="256"/>
-            <ac:spMk id="22" creationId="{9B37791B-B040-4694-BFDC-8DD132D86E8E}"/>
-          </ac:spMkLst>
-        </pc:spChg>
-        <pc:spChg chg="add del">
-          <ac:chgData name="Judah Drelich" userId="b58a0b8387fae8c8" providerId="LiveId" clId="{3DDDD3D5-768F-4329-835D-C3D8D568ECA8}" dt="2023-06-07T20:59:24.670" v="11" actId="26606"/>
-          <ac:spMkLst>
-            <pc:docMk/>
-            <pc:sldMk cId="299978964" sldId="256"/>
-            <ac:spMk id="25" creationId="{8C790BE2-4E4F-4AAF-81A2-4A6F4885EBE6}"/>
-          </ac:spMkLst>
-        </pc:spChg>
-        <pc:spChg chg="add del">
-          <ac:chgData name="Judah Drelich" userId="b58a0b8387fae8c8" providerId="LiveId" clId="{3DDDD3D5-768F-4329-835D-C3D8D568ECA8}" dt="2023-06-07T20:59:24.670" v="11" actId="26606"/>
-          <ac:spMkLst>
-            <pc:docMk/>
-            <pc:sldMk cId="299978964" sldId="256"/>
-            <ac:spMk id="27" creationId="{D28B54C3-B57B-472A-B96E-1FCB67093DC2}"/>
-          </ac:spMkLst>
-        </pc:spChg>
-        <pc:spChg chg="add">
-          <ac:chgData name="Judah Drelich" userId="b58a0b8387fae8c8" providerId="LiveId" clId="{3DDDD3D5-768F-4329-835D-C3D8D568ECA8}" dt="2023-06-07T21:01:44.556" v="26" actId="26606"/>
-          <ac:spMkLst>
-            <pc:docMk/>
-            <pc:sldMk cId="299978964" sldId="256"/>
-            <ac:spMk id="28" creationId="{0671A8AE-40A1-4631-A6B8-581AFF065482}"/>
-          </ac:spMkLst>
-        </pc:spChg>
-        <pc:spChg chg="add del">
-          <ac:chgData name="Judah Drelich" userId="b58a0b8387fae8c8" providerId="LiveId" clId="{3DDDD3D5-768F-4329-835D-C3D8D568ECA8}" dt="2023-06-07T20:59:24.670" v="11" actId="26606"/>
-          <ac:spMkLst>
-            <pc:docMk/>
-            <pc:sldMk cId="299978964" sldId="256"/>
-            <ac:spMk id="29" creationId="{7DB3C429-F8DA-49B9-AF84-21996FCF78B5}"/>
-          </ac:spMkLst>
-        </pc:spChg>
-        <pc:spChg chg="add">
-          <ac:chgData name="Judah Drelich" userId="b58a0b8387fae8c8" providerId="LiveId" clId="{3DDDD3D5-768F-4329-835D-C3D8D568ECA8}" dt="2023-06-07T21:01:44.556" v="26" actId="26606"/>
-          <ac:spMkLst>
-            <pc:docMk/>
-            <pc:sldMk cId="299978964" sldId="256"/>
-            <ac:spMk id="30" creationId="{AB58EF07-17C2-48CF-ABB0-EEF1F17CB8F0}"/>
-          </ac:spMkLst>
-        </pc:spChg>
-        <pc:spChg chg="add del">
-          <ac:chgData name="Judah Drelich" userId="b58a0b8387fae8c8" providerId="LiveId" clId="{3DDDD3D5-768F-4329-835D-C3D8D568ECA8}" dt="2023-06-07T20:59:24.670" v="11" actId="26606"/>
-          <ac:spMkLst>
-            <pc:docMk/>
-            <pc:sldMk cId="299978964" sldId="256"/>
-            <ac:spMk id="31" creationId="{C4C9F2B0-1044-46EB-8AEB-C3BFFDE6C2CC}"/>
-          </ac:spMkLst>
-        </pc:spChg>
-        <pc:spChg chg="add del">
-          <ac:chgData name="Judah Drelich" userId="b58a0b8387fae8c8" providerId="LiveId" clId="{3DDDD3D5-768F-4329-835D-C3D8D568ECA8}" dt="2023-06-07T20:59:24.670" v="11" actId="26606"/>
-          <ac:spMkLst>
-            <pc:docMk/>
-            <pc:sldMk cId="299978964" sldId="256"/>
-            <ac:spMk id="33" creationId="{32B3ACB3-D689-442E-8A40-8680B0FEB8A2}"/>
-          </ac:spMkLst>
-        </pc:spChg>
-        <pc:spChg chg="add del">
-          <ac:chgData name="Judah Drelich" userId="b58a0b8387fae8c8" providerId="LiveId" clId="{3DDDD3D5-768F-4329-835D-C3D8D568ECA8}" dt="2023-06-07T20:59:32.561" v="14"/>
-          <ac:spMkLst>
-            <pc:docMk/>
-            <pc:sldMk cId="299978964" sldId="256"/>
-            <ac:spMk id="35" creationId="{BB02F283-AD3D-43EB-8EB3-EEABE7B685DD}"/>
-          </ac:spMkLst>
-        </pc:spChg>
-        <pc:spChg chg="add del">
-          <ac:chgData name="Judah Drelich" userId="b58a0b8387fae8c8" providerId="LiveId" clId="{3DDDD3D5-768F-4329-835D-C3D8D568ECA8}" dt="2023-06-07T20:59:32.561" v="14"/>
-          <ac:spMkLst>
-            <pc:docMk/>
-            <pc:sldMk cId="299978964" sldId="256"/>
-            <ac:spMk id="37" creationId="{87267ACD-C9FA-48F7-BA90-C05046F4EEDF}"/>
-          </ac:spMkLst>
-        </pc:spChg>
-        <pc:spChg chg="add del">
-          <ac:chgData name="Judah Drelich" userId="b58a0b8387fae8c8" providerId="LiveId" clId="{3DDDD3D5-768F-4329-835D-C3D8D568ECA8}" dt="2023-06-07T20:59:32.561" v="14"/>
-          <ac:spMkLst>
-            <pc:docMk/>
-            <pc:sldMk cId="299978964" sldId="256"/>
-            <ac:spMk id="38" creationId="{53E17AA8-C417-4F74-9F1B-EAD82A19B73C}"/>
-          </ac:spMkLst>
-        </pc:spChg>
-        <pc:spChg chg="add del">
-          <ac:chgData name="Judah Drelich" userId="b58a0b8387fae8c8" providerId="LiveId" clId="{3DDDD3D5-768F-4329-835D-C3D8D568ECA8}" dt="2023-06-07T20:59:32.561" v="14"/>
-          <ac:spMkLst>
-            <pc:docMk/>
-            <pc:sldMk cId="299978964" sldId="256"/>
-            <ac:spMk id="39" creationId="{D79F9CB9-0076-49F5-845A-C97CCFC1639A}"/>
-          </ac:spMkLst>
-        </pc:spChg>
-        <pc:spChg chg="add del">
-          <ac:chgData name="Judah Drelich" userId="b58a0b8387fae8c8" providerId="LiveId" clId="{3DDDD3D5-768F-4329-835D-C3D8D568ECA8}" dt="2023-06-07T20:59:32.561" v="14"/>
-          <ac:spMkLst>
-            <pc:docMk/>
-            <pc:sldMk cId="299978964" sldId="256"/>
-            <ac:spMk id="40" creationId="{0567348B-D4F9-4978-8FB4-D4031CD133ED}"/>
-          </ac:spMkLst>
-        </pc:spChg>
-        <pc:spChg chg="add">
-          <ac:chgData name="Judah Drelich" userId="b58a0b8387fae8c8" providerId="LiveId" clId="{3DDDD3D5-768F-4329-835D-C3D8D568ECA8}" dt="2023-06-07T21:01:44.556" v="26" actId="26606"/>
-          <ac:spMkLst>
-            <pc:docMk/>
-            <pc:sldMk cId="299978964" sldId="256"/>
-            <ac:spMk id="41" creationId="{AF2F604E-43BE-4DC3-B983-E071523364F8}"/>
-          </ac:spMkLst>
-        </pc:spChg>
-        <pc:spChg chg="add">
-          <ac:chgData name="Judah Drelich" userId="b58a0b8387fae8c8" providerId="LiveId" clId="{3DDDD3D5-768F-4329-835D-C3D8D568ECA8}" dt="2023-06-07T21:01:44.556" v="26" actId="26606"/>
-          <ac:spMkLst>
-            <pc:docMk/>
-            <pc:sldMk cId="299978964" sldId="256"/>
-            <ac:spMk id="42" creationId="{08C9B587-E65E-4B52-B37C-ABEBB6E87928}"/>
-          </ac:spMkLst>
-        </pc:spChg>
-        <pc:grpChg chg="add del">
-          <ac:chgData name="Judah Drelich" userId="b58a0b8387fae8c8" providerId="LiveId" clId="{3DDDD3D5-768F-4329-835D-C3D8D568ECA8}" dt="2023-06-07T21:01:44.541" v="25" actId="26606"/>
-          <ac:grpSpMkLst>
-            <pc:docMk/>
-            <pc:sldMk cId="299978964" sldId="256"/>
-            <ac:grpSpMk id="23" creationId="{4252769E-B9F0-4068-A645-5BBEF16E9C28}"/>
-          </ac:grpSpMkLst>
-        </pc:grpChg>
-        <pc:picChg chg="mod ord">
-          <ac:chgData name="Judah Drelich" userId="b58a0b8387fae8c8" providerId="LiveId" clId="{3DDDD3D5-768F-4329-835D-C3D8D568ECA8}" dt="2023-06-07T21:01:44.556" v="26" actId="26606"/>
-          <ac:picMkLst>
-            <pc:docMk/>
-            <pc:sldMk cId="299978964" sldId="256"/>
-            <ac:picMk id="6" creationId="{A64860B2-8E37-788A-7709-27BA4C689F87}"/>
-          </ac:picMkLst>
-        </pc:picChg>
-      </pc:sldChg>
-      <pc:sldChg chg="addSp delSp modSp mod setBg delDesignElem">
-        <pc:chgData name="Judah Drelich" userId="b58a0b8387fae8c8" providerId="LiveId" clId="{3DDDD3D5-768F-4329-835D-C3D8D568ECA8}" dt="2023-06-08T15:19:09.102" v="3496" actId="20577"/>
-        <pc:sldMkLst>
-          <pc:docMk/>
-          <pc:sldMk cId="1362066586" sldId="257"/>
-        </pc:sldMkLst>
-        <pc:spChg chg="del mod">
-          <ac:chgData name="Judah Drelich" userId="b58a0b8387fae8c8" providerId="LiveId" clId="{3DDDD3D5-768F-4329-835D-C3D8D568ECA8}" dt="2023-06-08T15:12:13.319" v="3286" actId="478"/>
-          <ac:spMkLst>
-            <pc:docMk/>
-            <pc:sldMk cId="1362066586" sldId="257"/>
-            <ac:spMk id="2" creationId="{32817360-BDFA-FA90-EA9B-9528DE063902}"/>
-          </ac:spMkLst>
-        </pc:spChg>
-        <pc:spChg chg="add mod">
-          <ac:chgData name="Judah Drelich" userId="b58a0b8387fae8c8" providerId="LiveId" clId="{3DDDD3D5-768F-4329-835D-C3D8D568ECA8}" dt="2023-06-08T15:19:09.102" v="3496" actId="20577"/>
-          <ac:spMkLst>
-            <pc:docMk/>
-            <pc:sldMk cId="1362066586" sldId="257"/>
-            <ac:spMk id="3" creationId="{925CA678-DCA3-0720-3C2F-368F3E91AFE2}"/>
-          </ac:spMkLst>
-        </pc:spChg>
-        <pc:spChg chg="add">
-          <ac:chgData name="Judah Drelich" userId="b58a0b8387fae8c8" providerId="LiveId" clId="{3DDDD3D5-768F-4329-835D-C3D8D568ECA8}" dt="2023-06-07T21:02:13.770" v="27" actId="26606"/>
-          <ac:spMkLst>
-            <pc:docMk/>
-            <pc:sldMk cId="1362066586" sldId="257"/>
-            <ac:spMk id="4" creationId="{0E30439A-8A5B-46EC-8283-9B6B031D40D0}"/>
-          </ac:spMkLst>
-        </pc:spChg>
-        <pc:spChg chg="add">
-          <ac:chgData name="Judah Drelich" userId="b58a0b8387fae8c8" providerId="LiveId" clId="{3DDDD3D5-768F-4329-835D-C3D8D568ECA8}" dt="2023-06-07T21:02:13.770" v="27" actId="26606"/>
-          <ac:spMkLst>
-            <pc:docMk/>
-            <pc:sldMk cId="1362066586" sldId="257"/>
-            <ac:spMk id="5" creationId="{5CEAD642-85CF-4750-8432-7C80C901F001}"/>
-          </ac:spMkLst>
-        </pc:spChg>
-        <pc:spChg chg="add mod">
-          <ac:chgData name="Judah Drelich" userId="b58a0b8387fae8c8" providerId="LiveId" clId="{3DDDD3D5-768F-4329-835D-C3D8D568ECA8}" dt="2023-06-08T15:13:04.619" v="3311" actId="1076"/>
-          <ac:spMkLst>
-            <pc:docMk/>
-            <pc:sldMk cId="1362066586" sldId="257"/>
-            <ac:spMk id="8" creationId="{7FFE61EE-A053-2A72-216F-CBCC4FA65408}"/>
-          </ac:spMkLst>
-        </pc:spChg>
-        <pc:spChg chg="add">
-          <ac:chgData name="Judah Drelich" userId="b58a0b8387fae8c8" providerId="LiveId" clId="{3DDDD3D5-768F-4329-835D-C3D8D568ECA8}" dt="2023-06-07T21:02:13.770" v="27" actId="26606"/>
-          <ac:spMkLst>
-            <pc:docMk/>
-            <pc:sldMk cId="1362066586" sldId="257"/>
-            <ac:spMk id="11" creationId="{FA33EEAE-15D5-4119-8C1E-89D943F911EF}"/>
-          </ac:spMkLst>
-        </pc:spChg>
-        <pc:spChg chg="add">
-          <ac:chgData name="Judah Drelich" userId="b58a0b8387fae8c8" providerId="LiveId" clId="{3DDDD3D5-768F-4329-835D-C3D8D568ECA8}" dt="2023-06-07T21:02:13.770" v="27" actId="26606"/>
-          <ac:spMkLst>
-            <pc:docMk/>
-            <pc:sldMk cId="1362066586" sldId="257"/>
-            <ac:spMk id="13" creationId="{730D8B3B-9B80-4025-B934-26DC7D7CD231}"/>
-          </ac:spMkLst>
-        </pc:spChg>
-        <pc:spChg chg="add">
-          <ac:chgData name="Judah Drelich" userId="b58a0b8387fae8c8" providerId="LiveId" clId="{3DDDD3D5-768F-4329-835D-C3D8D568ECA8}" dt="2023-06-07T21:02:13.770" v="27" actId="26606"/>
-          <ac:spMkLst>
-            <pc:docMk/>
-            <pc:sldMk cId="1362066586" sldId="257"/>
-            <ac:spMk id="15" creationId="{B5A1B09C-1565-46F8-B70F-621C5EB48A09}"/>
-          </ac:spMkLst>
-        </pc:spChg>
-        <pc:spChg chg="add">
-          <ac:chgData name="Judah Drelich" userId="b58a0b8387fae8c8" providerId="LiveId" clId="{3DDDD3D5-768F-4329-835D-C3D8D568ECA8}" dt="2023-06-07T21:02:13.770" v="27" actId="26606"/>
-          <ac:spMkLst>
-            <pc:docMk/>
-            <pc:sldMk cId="1362066586" sldId="257"/>
-            <ac:spMk id="17" creationId="{8C516CC8-80AC-446C-A56E-9F54B7210402}"/>
-          </ac:spMkLst>
-        </pc:spChg>
-        <pc:spChg chg="add">
-          <ac:chgData name="Judah Drelich" userId="b58a0b8387fae8c8" providerId="LiveId" clId="{3DDDD3D5-768F-4329-835D-C3D8D568ECA8}" dt="2023-06-07T21:02:13.770" v="27" actId="26606"/>
-          <ac:spMkLst>
-            <pc:docMk/>
-            <pc:sldMk cId="1362066586" sldId="257"/>
-            <ac:spMk id="19" creationId="{53947E58-F088-49F1-A3D1-DEA690192E84}"/>
-          </ac:spMkLst>
-        </pc:spChg>
-        <pc:spChg chg="add del">
-          <ac:chgData name="Judah Drelich" userId="b58a0b8387fae8c8" providerId="LiveId" clId="{3DDDD3D5-768F-4329-835D-C3D8D568ECA8}" dt="2023-06-07T21:00:49.088" v="19"/>
-          <ac:spMkLst>
-            <pc:docMk/>
-            <pc:sldMk cId="1362066586" sldId="257"/>
-            <ac:spMk id="65" creationId="{B7D4B16D-600A-41A1-8B1B-3727C56C0C9B}"/>
-          </ac:spMkLst>
-        </pc:spChg>
-        <pc:spChg chg="add mod">
-          <ac:chgData name="Judah Drelich" userId="b58a0b8387fae8c8" providerId="LiveId" clId="{3DDDD3D5-768F-4329-835D-C3D8D568ECA8}" dt="2023-06-08T15:16:02.039" v="3406"/>
-          <ac:spMkLst>
-            <pc:docMk/>
-            <pc:sldMk cId="1362066586" sldId="257"/>
-            <ac:spMk id="66" creationId="{B22BC7AE-2DA1-0D72-F084-6784ADB614DE}"/>
-          </ac:spMkLst>
-        </pc:spChg>
-        <pc:grpChg chg="add del">
-          <ac:chgData name="Judah Drelich" userId="b58a0b8387fae8c8" providerId="LiveId" clId="{3DDDD3D5-768F-4329-835D-C3D8D568ECA8}" dt="2023-06-07T21:00:49.088" v="19"/>
-          <ac:grpSpMkLst>
-            <pc:docMk/>
-            <pc:sldMk cId="1362066586" sldId="257"/>
-            <ac:grpSpMk id="9" creationId="{FF5EAD09-B81D-415F-8BCF-73C81AE05F21}"/>
-          </ac:grpSpMkLst>
-        </pc:grpChg>
-        <pc:grpChg chg="add del">
-          <ac:chgData name="Judah Drelich" userId="b58a0b8387fae8c8" providerId="LiveId" clId="{3DDDD3D5-768F-4329-835D-C3D8D568ECA8}" dt="2023-06-07T21:00:49.088" v="19"/>
-          <ac:grpSpMkLst>
-            <pc:docMk/>
-            <pc:sldMk cId="1362066586" sldId="257"/>
-            <ac:grpSpMk id="67" creationId="{DE7C35E0-BD19-4AFC-81BF-7A7507E9C94D}"/>
-          </ac:grpSpMkLst>
-        </pc:grpChg>
-        <pc:picChg chg="add del">
-          <ac:chgData name="Judah Drelich" userId="b58a0b8387fae8c8" providerId="LiveId" clId="{3DDDD3D5-768F-4329-835D-C3D8D568ECA8}" dt="2023-06-07T21:00:49.088" v="19"/>
-          <ac:picMkLst>
-            <pc:docMk/>
-            <pc:sldMk cId="1362066586" sldId="257"/>
-            <ac:picMk id="7" creationId="{9ACD3AF8-B16E-4174-8C1A-41F683C4AF8A}"/>
-          </ac:picMkLst>
-        </pc:picChg>
-        <pc:picChg chg="add del">
-          <ac:chgData name="Judah Drelich" userId="b58a0b8387fae8c8" providerId="LiveId" clId="{3DDDD3D5-768F-4329-835D-C3D8D568ECA8}" dt="2023-06-07T21:00:49.088" v="19"/>
-          <ac:picMkLst>
-            <pc:docMk/>
-            <pc:sldMk cId="1362066586" sldId="257"/>
-            <ac:picMk id="123" creationId="{51039561-92F9-40EE-900B-6AA0F58042A4}"/>
-          </ac:picMkLst>
-        </pc:picChg>
-        <pc:cxnChg chg="add del">
-          <ac:chgData name="Judah Drelich" userId="b58a0b8387fae8c8" providerId="LiveId" clId="{3DDDD3D5-768F-4329-835D-C3D8D568ECA8}" dt="2023-06-07T21:00:49.088" v="19"/>
-          <ac:cxnSpMkLst>
-            <pc:docMk/>
-            <pc:sldMk cId="1362066586" sldId="257"/>
-            <ac:cxnSpMk id="125" creationId="{D902DA06-324A-48CE-8C20-94535480A632}"/>
-          </ac:cxnSpMkLst>
-        </pc:cxnChg>
-      </pc:sldChg>
-      <pc:sldChg chg="addSp modSp del mod setBg">
-        <pc:chgData name="Judah Drelich" userId="b58a0b8387fae8c8" providerId="LiveId" clId="{3DDDD3D5-768F-4329-835D-C3D8D568ECA8}" dt="2023-06-07T21:20:20.602" v="33" actId="47"/>
-        <pc:sldMkLst>
-          <pc:docMk/>
-          <pc:sldMk cId="219303998" sldId="258"/>
-        </pc:sldMkLst>
-        <pc:spChg chg="mod">
-          <ac:chgData name="Judah Drelich" userId="b58a0b8387fae8c8" providerId="LiveId" clId="{3DDDD3D5-768F-4329-835D-C3D8D568ECA8}" dt="2023-06-07T21:19:58.397" v="31" actId="26606"/>
-          <ac:spMkLst>
-            <pc:docMk/>
-            <pc:sldMk cId="219303998" sldId="258"/>
-            <ac:spMk id="2" creationId="{D19E6291-EACF-2403-7FCE-1E9A655DF3C5}"/>
-          </ac:spMkLst>
-        </pc:spChg>
-        <pc:spChg chg="mod">
-          <ac:chgData name="Judah Drelich" userId="b58a0b8387fae8c8" providerId="LiveId" clId="{3DDDD3D5-768F-4329-835D-C3D8D568ECA8}" dt="2023-06-07T21:19:58.397" v="31" actId="26606"/>
-          <ac:spMkLst>
-            <pc:docMk/>
-            <pc:sldMk cId="219303998" sldId="258"/>
-            <ac:spMk id="3" creationId="{532230AD-270C-8440-3827-3E5501C38809}"/>
-          </ac:spMkLst>
-        </pc:spChg>
-        <pc:spChg chg="add">
-          <ac:chgData name="Judah Drelich" userId="b58a0b8387fae8c8" providerId="LiveId" clId="{3DDDD3D5-768F-4329-835D-C3D8D568ECA8}" dt="2023-06-07T21:19:58.397" v="31" actId="26606"/>
-          <ac:spMkLst>
-            <pc:docMk/>
-            <pc:sldMk cId="219303998" sldId="258"/>
-            <ac:spMk id="8" creationId="{1B15ED52-F352-441B-82BF-E0EA34836D08}"/>
-          </ac:spMkLst>
-        </pc:spChg>
-        <pc:spChg chg="add">
-          <ac:chgData name="Judah Drelich" userId="b58a0b8387fae8c8" providerId="LiveId" clId="{3DDDD3D5-768F-4329-835D-C3D8D568ECA8}" dt="2023-06-07T21:19:58.397" v="31" actId="26606"/>
-          <ac:spMkLst>
-            <pc:docMk/>
-            <pc:sldMk cId="219303998" sldId="258"/>
-            <ac:spMk id="10" creationId="{3B2E3793-BFE6-45A2-9B7B-E18844431C99}"/>
-          </ac:spMkLst>
-        </pc:spChg>
-        <pc:spChg chg="add">
-          <ac:chgData name="Judah Drelich" userId="b58a0b8387fae8c8" providerId="LiveId" clId="{3DDDD3D5-768F-4329-835D-C3D8D568ECA8}" dt="2023-06-07T21:19:58.397" v="31" actId="26606"/>
-          <ac:spMkLst>
-            <pc:docMk/>
-            <pc:sldMk cId="219303998" sldId="258"/>
-            <ac:spMk id="12" creationId="{BC4C4868-CB8F-4AF9-9CDB-8108F2C19B67}"/>
-          </ac:spMkLst>
-        </pc:spChg>
-        <pc:spChg chg="add">
-          <ac:chgData name="Judah Drelich" userId="b58a0b8387fae8c8" providerId="LiveId" clId="{3DDDD3D5-768F-4329-835D-C3D8D568ECA8}" dt="2023-06-07T21:19:58.397" v="31" actId="26606"/>
-          <ac:spMkLst>
-            <pc:docMk/>
-            <pc:sldMk cId="219303998" sldId="258"/>
-            <ac:spMk id="14" creationId="{375E0459-6403-40CD-989D-56A4407CA12E}"/>
-          </ac:spMkLst>
-        </pc:spChg>
-        <pc:spChg chg="add">
-          <ac:chgData name="Judah Drelich" userId="b58a0b8387fae8c8" providerId="LiveId" clId="{3DDDD3D5-768F-4329-835D-C3D8D568ECA8}" dt="2023-06-07T21:19:58.397" v="31" actId="26606"/>
-          <ac:spMkLst>
-            <pc:docMk/>
-            <pc:sldMk cId="219303998" sldId="258"/>
-            <ac:spMk id="16" creationId="{53E5B1A8-3AC9-4BD1-9BBC-78CA94F2D1BA}"/>
-          </ac:spMkLst>
-        </pc:spChg>
-      </pc:sldChg>
-      <pc:sldChg chg="addSp delSp modSp add mod">
-        <pc:chgData name="Judah Drelich" userId="b58a0b8387fae8c8" providerId="LiveId" clId="{3DDDD3D5-768F-4329-835D-C3D8D568ECA8}" dt="2023-06-08T15:20:03.006" v="3503" actId="1076"/>
-        <pc:sldMkLst>
-          <pc:docMk/>
-          <pc:sldMk cId="686855658" sldId="259"/>
-        </pc:sldMkLst>
-        <pc:spChg chg="del mod">
-          <ac:chgData name="Judah Drelich" userId="b58a0b8387fae8c8" providerId="LiveId" clId="{3DDDD3D5-768F-4329-835D-C3D8D568ECA8}" dt="2023-06-08T00:00:31.128" v="351" actId="478"/>
-          <ac:spMkLst>
-            <pc:docMk/>
-            <pc:sldMk cId="686855658" sldId="259"/>
-            <ac:spMk id="2" creationId="{32817360-BDFA-FA90-EA9B-9528DE063902}"/>
-          </ac:spMkLst>
-        </pc:spChg>
-        <pc:spChg chg="add del mod">
-          <ac:chgData name="Judah Drelich" userId="b58a0b8387fae8c8" providerId="LiveId" clId="{3DDDD3D5-768F-4329-835D-C3D8D568ECA8}" dt="2023-06-07T23:20:42.359" v="220"/>
-          <ac:spMkLst>
-            <pc:docMk/>
-            <pc:sldMk cId="686855658" sldId="259"/>
-            <ac:spMk id="3" creationId="{67F48946-19F4-B260-5A87-C55E62E0401A}"/>
-          </ac:spMkLst>
-        </pc:spChg>
-        <pc:spChg chg="add mod">
-          <ac:chgData name="Judah Drelich" userId="b58a0b8387fae8c8" providerId="LiveId" clId="{3DDDD3D5-768F-4329-835D-C3D8D568ECA8}" dt="2023-06-08T15:20:03.006" v="3503" actId="1076"/>
-          <ac:spMkLst>
-            <pc:docMk/>
-            <pc:sldMk cId="686855658" sldId="259"/>
-            <ac:spMk id="8" creationId="{FD5987D5-E099-01EA-F917-3929B49743AB}"/>
-          </ac:spMkLst>
-        </pc:spChg>
-        <pc:spChg chg="add mod">
-          <ac:chgData name="Judah Drelich" userId="b58a0b8387fae8c8" providerId="LiveId" clId="{3DDDD3D5-768F-4329-835D-C3D8D568ECA8}" dt="2023-06-08T11:01:01.316" v="1438" actId="1076"/>
-          <ac:spMkLst>
-            <pc:docMk/>
-            <pc:sldMk cId="686855658" sldId="259"/>
-            <ac:spMk id="10" creationId="{DB533BFE-295B-FA95-C472-AACA26627E7C}"/>
-          </ac:spMkLst>
-        </pc:spChg>
-        <pc:picChg chg="add mod">
-          <ac:chgData name="Judah Drelich" userId="b58a0b8387fae8c8" providerId="LiveId" clId="{3DDDD3D5-768F-4329-835D-C3D8D568ECA8}" dt="2023-06-08T10:59:58.804" v="1318" actId="1076"/>
-          <ac:picMkLst>
-            <pc:docMk/>
-            <pc:sldMk cId="686855658" sldId="259"/>
-            <ac:picMk id="6" creationId="{E39FA6DD-F116-99E5-C483-8C380B23A861}"/>
-          </ac:picMkLst>
-        </pc:picChg>
-      </pc:sldChg>
-      <pc:sldChg chg="modSp add del mod">
-        <pc:chgData name="Judah Drelich" userId="b58a0b8387fae8c8" providerId="LiveId" clId="{3DDDD3D5-768F-4329-835D-C3D8D568ECA8}" dt="2023-06-07T23:20:00.765" v="209" actId="47"/>
-        <pc:sldMkLst>
-          <pc:docMk/>
-          <pc:sldMk cId="1182976785" sldId="260"/>
-        </pc:sldMkLst>
-        <pc:spChg chg="mod">
-          <ac:chgData name="Judah Drelich" userId="b58a0b8387fae8c8" providerId="LiveId" clId="{3DDDD3D5-768F-4329-835D-C3D8D568ECA8}" dt="2023-06-07T23:17:52.474" v="204" actId="5793"/>
-          <ac:spMkLst>
-            <pc:docMk/>
-            <pc:sldMk cId="1182976785" sldId="260"/>
-            <ac:spMk id="3" creationId="{67F48946-19F4-B260-5A87-C55E62E0401A}"/>
-          </ac:spMkLst>
-        </pc:spChg>
-      </pc:sldChg>
-      <pc:sldChg chg="addSp delSp modSp add del mod">
-        <pc:chgData name="Judah Drelich" userId="b58a0b8387fae8c8" providerId="LiveId" clId="{3DDDD3D5-768F-4329-835D-C3D8D568ECA8}" dt="2023-06-08T13:16:08.653" v="2688" actId="47"/>
-        <pc:sldMkLst>
-          <pc:docMk/>
-          <pc:sldMk cId="3319301917" sldId="260"/>
-        </pc:sldMkLst>
-        <pc:spChg chg="del mod">
-          <ac:chgData name="Judah Drelich" userId="b58a0b8387fae8c8" providerId="LiveId" clId="{3DDDD3D5-768F-4329-835D-C3D8D568ECA8}" dt="2023-06-08T00:23:16.308" v="776" actId="478"/>
-          <ac:spMkLst>
-            <pc:docMk/>
-            <pc:sldMk cId="3319301917" sldId="260"/>
-            <ac:spMk id="2" creationId="{32817360-BDFA-FA90-EA9B-9528DE063902}"/>
-          </ac:spMkLst>
-        </pc:spChg>
-        <pc:spChg chg="mod">
-          <ac:chgData name="Judah Drelich" userId="b58a0b8387fae8c8" providerId="LiveId" clId="{3DDDD3D5-768F-4329-835D-C3D8D568ECA8}" dt="2023-06-07T23:55:37.180" v="261" actId="20577"/>
-          <ac:spMkLst>
-            <pc:docMk/>
-            <pc:sldMk cId="3319301917" sldId="260"/>
-            <ac:spMk id="3" creationId="{925CA678-DCA3-0720-3C2F-368F3E91AFE2}"/>
-          </ac:spMkLst>
-        </pc:spChg>
-        <pc:spChg chg="add mod">
-          <ac:chgData name="Judah Drelich" userId="b58a0b8387fae8c8" providerId="LiveId" clId="{3DDDD3D5-768F-4329-835D-C3D8D568ECA8}" dt="2023-06-08T09:26:59.559" v="841" actId="113"/>
-          <ac:spMkLst>
-            <pc:docMk/>
-            <pc:sldMk cId="3319301917" sldId="260"/>
-            <ac:spMk id="7" creationId="{3C10B0DA-01D3-1B5D-C2FD-2D10697930C8}"/>
-          </ac:spMkLst>
-        </pc:spChg>
-        <pc:spChg chg="add mod">
-          <ac:chgData name="Judah Drelich" userId="b58a0b8387fae8c8" providerId="LiveId" clId="{3DDDD3D5-768F-4329-835D-C3D8D568ECA8}" dt="2023-06-08T09:26:48.062" v="840" actId="255"/>
-          <ac:spMkLst>
-            <pc:docMk/>
-            <pc:sldMk cId="3319301917" sldId="260"/>
-            <ac:spMk id="9" creationId="{545A7981-1DCF-03A3-B178-D462AFAD6487}"/>
-          </ac:spMkLst>
-        </pc:spChg>
-      </pc:sldChg>
-      <pc:sldChg chg="new del">
-        <pc:chgData name="Judah Drelich" userId="b58a0b8387fae8c8" providerId="LiveId" clId="{3DDDD3D5-768F-4329-835D-C3D8D568ECA8}" dt="2023-06-07T21:20:43.121" v="35" actId="47"/>
-        <pc:sldMkLst>
-          <pc:docMk/>
-          <pc:sldMk cId="3492561799" sldId="260"/>
-        </pc:sldMkLst>
-      </pc:sldChg>
-      <pc:sldChg chg="new del">
-        <pc:chgData name="Judah Drelich" userId="b58a0b8387fae8c8" providerId="LiveId" clId="{3DDDD3D5-768F-4329-835D-C3D8D568ECA8}" dt="2023-06-07T23:17:37.759" v="200" actId="47"/>
-        <pc:sldMkLst>
-          <pc:docMk/>
-          <pc:sldMk cId="3728885161" sldId="260"/>
-        </pc:sldMkLst>
-      </pc:sldChg>
-      <pc:sldChg chg="add del">
-        <pc:chgData name="Judah Drelich" userId="b58a0b8387fae8c8" providerId="LiveId" clId="{3DDDD3D5-768F-4329-835D-C3D8D568ECA8}" dt="2023-06-07T23:20:01.499" v="210" actId="47"/>
-        <pc:sldMkLst>
-          <pc:docMk/>
-          <pc:sldMk cId="11469421" sldId="261"/>
-        </pc:sldMkLst>
-      </pc:sldChg>
-      <pc:sldChg chg="addSp delSp modSp add mod">
-        <pc:chgData name="Judah Drelich" userId="b58a0b8387fae8c8" providerId="LiveId" clId="{3DDDD3D5-768F-4329-835D-C3D8D568ECA8}" dt="2023-06-08T15:19:31.013" v="3497" actId="1076"/>
-        <pc:sldMkLst>
-          <pc:docMk/>
-          <pc:sldMk cId="2239713755" sldId="261"/>
-        </pc:sldMkLst>
-        <pc:spChg chg="del mod">
-          <ac:chgData name="Judah Drelich" userId="b58a0b8387fae8c8" providerId="LiveId" clId="{3DDDD3D5-768F-4329-835D-C3D8D568ECA8}" dt="2023-06-08T10:54:56.585" v="1064" actId="478"/>
-          <ac:spMkLst>
-            <pc:docMk/>
-            <pc:sldMk cId="2239713755" sldId="261"/>
-            <ac:spMk id="2" creationId="{32817360-BDFA-FA90-EA9B-9528DE063902}"/>
-          </ac:spMkLst>
-        </pc:spChg>
-        <pc:spChg chg="mod">
-          <ac:chgData name="Judah Drelich" userId="b58a0b8387fae8c8" providerId="LiveId" clId="{3DDDD3D5-768F-4329-835D-C3D8D568ECA8}" dt="2023-06-07T23:21:15.317" v="222" actId="6549"/>
-          <ac:spMkLst>
-            <pc:docMk/>
-            <pc:sldMk cId="2239713755" sldId="261"/>
-            <ac:spMk id="3" creationId="{925CA678-DCA3-0720-3C2F-368F3E91AFE2}"/>
-          </ac:spMkLst>
-        </pc:spChg>
-        <pc:spChg chg="add mod">
-          <ac:chgData name="Judah Drelich" userId="b58a0b8387fae8c8" providerId="LiveId" clId="{3DDDD3D5-768F-4329-835D-C3D8D568ECA8}" dt="2023-06-08T15:19:31.013" v="3497" actId="1076"/>
-          <ac:spMkLst>
-            <pc:docMk/>
-            <pc:sldMk cId="2239713755" sldId="261"/>
-            <ac:spMk id="8" creationId="{0F2B757D-0BCA-EA6B-4D79-709827A4E5EB}"/>
-          </ac:spMkLst>
-        </pc:spChg>
-        <pc:spChg chg="add mod">
-          <ac:chgData name="Judah Drelich" userId="b58a0b8387fae8c8" providerId="LiveId" clId="{3DDDD3D5-768F-4329-835D-C3D8D568ECA8}" dt="2023-06-08T10:57:48.370" v="1185" actId="1076"/>
-          <ac:spMkLst>
-            <pc:docMk/>
-            <pc:sldMk cId="2239713755" sldId="261"/>
-            <ac:spMk id="10" creationId="{94F9DC91-CEC7-5A1A-762B-20535D8DC410}"/>
-          </ac:spMkLst>
-        </pc:spChg>
-        <pc:picChg chg="add mod">
-          <ac:chgData name="Judah Drelich" userId="b58a0b8387fae8c8" providerId="LiveId" clId="{3DDDD3D5-768F-4329-835D-C3D8D568ECA8}" dt="2023-06-08T10:54:42.631" v="1061" actId="1076"/>
-          <ac:picMkLst>
-            <pc:docMk/>
-            <pc:sldMk cId="2239713755" sldId="261"/>
-            <ac:picMk id="6" creationId="{F1CC63B5-55EB-C86D-0819-99694EBAA866}"/>
-          </ac:picMkLst>
-        </pc:picChg>
-      </pc:sldChg>
-      <pc:sldChg chg="addSp delSp modSp add mod">
-        <pc:chgData name="Judah Drelich" userId="b58a0b8387fae8c8" providerId="LiveId" clId="{3DDDD3D5-768F-4329-835D-C3D8D568ECA8}" dt="2023-06-08T15:20:31.579" v="3508" actId="1076"/>
-        <pc:sldMkLst>
-          <pc:docMk/>
-          <pc:sldMk cId="1238803942" sldId="262"/>
-        </pc:sldMkLst>
-        <pc:spChg chg="del mod">
-          <ac:chgData name="Judah Drelich" userId="b58a0b8387fae8c8" providerId="LiveId" clId="{3DDDD3D5-768F-4329-835D-C3D8D568ECA8}" dt="2023-06-08T10:58:19.485" v="1192" actId="478"/>
-          <ac:spMkLst>
-            <pc:docMk/>
-            <pc:sldMk cId="1238803942" sldId="262"/>
-            <ac:spMk id="2" creationId="{32817360-BDFA-FA90-EA9B-9528DE063902}"/>
-          </ac:spMkLst>
-        </pc:spChg>
-        <pc:spChg chg="mod">
-          <ac:chgData name="Judah Drelich" userId="b58a0b8387fae8c8" providerId="LiveId" clId="{3DDDD3D5-768F-4329-835D-C3D8D568ECA8}" dt="2023-06-07T23:53:58.680" v="223" actId="6549"/>
-          <ac:spMkLst>
-            <pc:docMk/>
-            <pc:sldMk cId="1238803942" sldId="262"/>
-            <ac:spMk id="3" creationId="{925CA678-DCA3-0720-3C2F-368F3E91AFE2}"/>
-          </ac:spMkLst>
-        </pc:spChg>
-        <pc:spChg chg="add mod">
-          <ac:chgData name="Judah Drelich" userId="b58a0b8387fae8c8" providerId="LiveId" clId="{3DDDD3D5-768F-4329-835D-C3D8D568ECA8}" dt="2023-06-08T15:20:31.579" v="3508" actId="1076"/>
-          <ac:spMkLst>
-            <pc:docMk/>
-            <pc:sldMk cId="1238803942" sldId="262"/>
-            <ac:spMk id="8" creationId="{509EF0BB-16DF-AD89-02FC-549E721D359D}"/>
-          </ac:spMkLst>
-        </pc:spChg>
-        <pc:spChg chg="add mod">
-          <ac:chgData name="Judah Drelich" userId="b58a0b8387fae8c8" providerId="LiveId" clId="{3DDDD3D5-768F-4329-835D-C3D8D568ECA8}" dt="2023-06-08T10:59:45.937" v="1314" actId="20577"/>
-          <ac:spMkLst>
-            <pc:docMk/>
-            <pc:sldMk cId="1238803942" sldId="262"/>
-            <ac:spMk id="10" creationId="{21E1C51F-17DE-2ABD-B9F9-AE7D554B7903}"/>
-          </ac:spMkLst>
-        </pc:spChg>
-        <pc:picChg chg="add mod">
-          <ac:chgData name="Judah Drelich" userId="b58a0b8387fae8c8" providerId="LiveId" clId="{3DDDD3D5-768F-4329-835D-C3D8D568ECA8}" dt="2023-06-08T15:19:47.820" v="3501" actId="1076"/>
-          <ac:picMkLst>
-            <pc:docMk/>
-            <pc:sldMk cId="1238803942" sldId="262"/>
-            <ac:picMk id="6" creationId="{19DCD1E7-E893-EE00-E975-6E5FC5DF510A}"/>
-          </ac:picMkLst>
-        </pc:picChg>
-      </pc:sldChg>
-      <pc:sldChg chg="add del">
-        <pc:chgData name="Judah Drelich" userId="b58a0b8387fae8c8" providerId="LiveId" clId="{3DDDD3D5-768F-4329-835D-C3D8D568ECA8}" dt="2023-06-07T23:20:02.071" v="211" actId="47"/>
-        <pc:sldMkLst>
-          <pc:docMk/>
-          <pc:sldMk cId="3238872437" sldId="262"/>
-        </pc:sldMkLst>
-      </pc:sldChg>
-      <pc:sldChg chg="addSp delSp modSp add mod">
-        <pc:chgData name="Judah Drelich" userId="b58a0b8387fae8c8" providerId="LiveId" clId="{3DDDD3D5-768F-4329-835D-C3D8D568ECA8}" dt="2023-06-08T15:20:20.146" v="3506" actId="1076"/>
-        <pc:sldMkLst>
-          <pc:docMk/>
-          <pc:sldMk cId="1411218462" sldId="263"/>
-        </pc:sldMkLst>
-        <pc:spChg chg="add mod">
-          <ac:chgData name="Judah Drelich" userId="b58a0b8387fae8c8" providerId="LiveId" clId="{3DDDD3D5-768F-4329-835D-C3D8D568ECA8}" dt="2023-06-08T15:20:14.632" v="3505" actId="1076"/>
-          <ac:spMkLst>
-            <pc:docMk/>
-            <pc:sldMk cId="1411218462" sldId="263"/>
-            <ac:spMk id="2" creationId="{39CB5DAF-7D90-36D8-EF38-EA89E77F7314}"/>
-          </ac:spMkLst>
-        </pc:spChg>
-        <pc:spChg chg="add mod">
-          <ac:chgData name="Judah Drelich" userId="b58a0b8387fae8c8" providerId="LiveId" clId="{3DDDD3D5-768F-4329-835D-C3D8D568ECA8}" dt="2023-06-08T15:20:20.146" v="3506" actId="1076"/>
-          <ac:spMkLst>
-            <pc:docMk/>
-            <pc:sldMk cId="1411218462" sldId="263"/>
-            <ac:spMk id="7" creationId="{7A3B25D5-6391-0460-1513-53BC93D6504E}"/>
-          </ac:spMkLst>
-        </pc:spChg>
-        <pc:spChg chg="mod">
-          <ac:chgData name="Judah Drelich" userId="b58a0b8387fae8c8" providerId="LiveId" clId="{3DDDD3D5-768F-4329-835D-C3D8D568ECA8}" dt="2023-06-08T09:28:04.646" v="869" actId="1076"/>
-          <ac:spMkLst>
-            <pc:docMk/>
-            <pc:sldMk cId="1411218462" sldId="263"/>
-            <ac:spMk id="8" creationId="{FD5987D5-E099-01EA-F917-3929B49743AB}"/>
-          </ac:spMkLst>
-        </pc:spChg>
-        <pc:picChg chg="del">
-          <ac:chgData name="Judah Drelich" userId="b58a0b8387fae8c8" providerId="LiveId" clId="{3DDDD3D5-768F-4329-835D-C3D8D568ECA8}" dt="2023-06-08T00:02:01.838" v="384" actId="478"/>
-          <ac:picMkLst>
-            <pc:docMk/>
-            <pc:sldMk cId="1411218462" sldId="263"/>
-            <ac:picMk id="6" creationId="{E39FA6DD-F116-99E5-C483-8C380B23A861}"/>
-          </ac:picMkLst>
-        </pc:picChg>
-      </pc:sldChg>
-      <pc:sldChg chg="add del">
-        <pc:chgData name="Judah Drelich" userId="b58a0b8387fae8c8" providerId="LiveId" clId="{3DDDD3D5-768F-4329-835D-C3D8D568ECA8}" dt="2023-06-07T23:20:02.553" v="212" actId="47"/>
-        <pc:sldMkLst>
-          <pc:docMk/>
-          <pc:sldMk cId="3911149886" sldId="263"/>
-        </pc:sldMkLst>
-      </pc:sldChg>
-      <pc:sldChg chg="add del">
-        <pc:chgData name="Judah Drelich" userId="b58a0b8387fae8c8" providerId="LiveId" clId="{3DDDD3D5-768F-4329-835D-C3D8D568ECA8}" dt="2023-06-07T23:20:03.159" v="213" actId="47"/>
-        <pc:sldMkLst>
-          <pc:docMk/>
-          <pc:sldMk cId="114462921" sldId="264"/>
-        </pc:sldMkLst>
-      </pc:sldChg>
-      <pc:sldChg chg="addSp delSp modSp add mod">
-        <pc:chgData name="Judah Drelich" userId="b58a0b8387fae8c8" providerId="LiveId" clId="{3DDDD3D5-768F-4329-835D-C3D8D568ECA8}" dt="2023-06-08T15:21:01.218" v="3513" actId="403"/>
-        <pc:sldMkLst>
-          <pc:docMk/>
-          <pc:sldMk cId="3990226166" sldId="264"/>
-        </pc:sldMkLst>
-        <pc:spChg chg="del mod">
-          <ac:chgData name="Judah Drelich" userId="b58a0b8387fae8c8" providerId="LiveId" clId="{3DDDD3D5-768F-4329-835D-C3D8D568ECA8}" dt="2023-06-08T09:29:50.580" v="895"/>
-          <ac:spMkLst>
-            <pc:docMk/>
-            <pc:sldMk cId="3990226166" sldId="264"/>
-            <ac:spMk id="2" creationId="{39CB5DAF-7D90-36D8-EF38-EA89E77F7314}"/>
-          </ac:spMkLst>
-        </pc:spChg>
-        <pc:spChg chg="add del mod">
-          <ac:chgData name="Judah Drelich" userId="b58a0b8387fae8c8" providerId="LiveId" clId="{3DDDD3D5-768F-4329-835D-C3D8D568ECA8}" dt="2023-06-08T15:20:39.805" v="3509" actId="1076"/>
-          <ac:spMkLst>
-            <pc:docMk/>
-            <pc:sldMk cId="3990226166" sldId="264"/>
-            <ac:spMk id="6" creationId="{82E00208-A83F-12CD-4EAD-461F1F0A88DD}"/>
-          </ac:spMkLst>
-        </pc:spChg>
-        <pc:spChg chg="del mod">
-          <ac:chgData name="Judah Drelich" userId="b58a0b8387fae8c8" providerId="LiveId" clId="{3DDDD3D5-768F-4329-835D-C3D8D568ECA8}" dt="2023-06-08T09:29:50.581" v="899"/>
-          <ac:spMkLst>
-            <pc:docMk/>
-            <pc:sldMk cId="3990226166" sldId="264"/>
-            <ac:spMk id="7" creationId="{7A3B25D5-6391-0460-1513-53BC93D6504E}"/>
-          </ac:spMkLst>
-        </pc:spChg>
-        <pc:spChg chg="del mod">
-          <ac:chgData name="Judah Drelich" userId="b58a0b8387fae8c8" providerId="LiveId" clId="{3DDDD3D5-768F-4329-835D-C3D8D568ECA8}" dt="2023-06-08T09:29:50.580" v="897"/>
-          <ac:spMkLst>
-            <pc:docMk/>
-            <pc:sldMk cId="3990226166" sldId="264"/>
-            <ac:spMk id="8" creationId="{FD5987D5-E099-01EA-F917-3929B49743AB}"/>
-          </ac:spMkLst>
-        </pc:spChg>
-        <pc:spChg chg="add del mod">
-          <ac:chgData name="Judah Drelich" userId="b58a0b8387fae8c8" providerId="LiveId" clId="{3DDDD3D5-768F-4329-835D-C3D8D568ECA8}" dt="2023-06-08T09:32:27.346" v="933"/>
-          <ac:spMkLst>
-            <pc:docMk/>
-            <pc:sldMk cId="3990226166" sldId="264"/>
-            <ac:spMk id="10" creationId="{9064EB80-FA17-9FFF-CE6A-41B62FCB53CB}"/>
-          </ac:spMkLst>
-        </pc:spChg>
-        <pc:spChg chg="add del">
-          <ac:chgData name="Judah Drelich" userId="b58a0b8387fae8c8" providerId="LiveId" clId="{3DDDD3D5-768F-4329-835D-C3D8D568ECA8}" dt="2023-06-08T09:32:33.195" v="935" actId="22"/>
-          <ac:spMkLst>
-            <pc:docMk/>
-            <pc:sldMk cId="3990226166" sldId="264"/>
-            <ac:spMk id="14" creationId="{4D5F2A75-6A5C-2723-55D3-9C41FB0AA4A8}"/>
-          </ac:spMkLst>
-        </pc:spChg>
-        <pc:spChg chg="add mod">
-          <ac:chgData name="Judah Drelich" userId="b58a0b8387fae8c8" providerId="LiveId" clId="{3DDDD3D5-768F-4329-835D-C3D8D568ECA8}" dt="2023-06-08T15:21:01.218" v="3513" actId="403"/>
-          <ac:spMkLst>
-            <pc:docMk/>
-            <pc:sldMk cId="3990226166" sldId="264"/>
-            <ac:spMk id="23" creationId="{DA70D46E-561D-088D-7F28-AA798F1DCD81}"/>
-          </ac:spMkLst>
-        </pc:spChg>
-        <pc:graphicFrameChg chg="add del mod modGraphic">
-          <ac:chgData name="Judah Drelich" userId="b58a0b8387fae8c8" providerId="LiveId" clId="{3DDDD3D5-768F-4329-835D-C3D8D568ECA8}" dt="2023-06-08T09:33:33.131" v="941" actId="478"/>
-          <ac:graphicFrameMkLst>
-            <pc:docMk/>
-            <pc:sldMk cId="3990226166" sldId="264"/>
-            <ac:graphicFrameMk id="18" creationId="{8E1C4C7E-16B2-61BD-1510-8F9C59E5F63B}"/>
-          </ac:graphicFrameMkLst>
-        </pc:graphicFrameChg>
-        <pc:graphicFrameChg chg="add mod modGraphic">
-          <ac:chgData name="Judah Drelich" userId="b58a0b8387fae8c8" providerId="LiveId" clId="{3DDDD3D5-768F-4329-835D-C3D8D568ECA8}" dt="2023-06-08T11:02:09.727" v="1467" actId="1076"/>
-          <ac:graphicFrameMkLst>
-            <pc:docMk/>
-            <pc:sldMk cId="3990226166" sldId="264"/>
-            <ac:graphicFrameMk id="20" creationId="{8BDA2A96-6056-EC9B-1D8B-FAF52C752B8D}"/>
-          </ac:graphicFrameMkLst>
-        </pc:graphicFrameChg>
-        <pc:picChg chg="add del">
-          <ac:chgData name="Judah Drelich" userId="b58a0b8387fae8c8" providerId="LiveId" clId="{3DDDD3D5-768F-4329-835D-C3D8D568ECA8}" dt="2023-06-08T09:32:54.251" v="937" actId="478"/>
-          <ac:picMkLst>
-            <pc:docMk/>
-            <pc:sldMk cId="3990226166" sldId="264"/>
-            <ac:picMk id="16" creationId="{61082F45-646C-3E2C-5419-B1398FECDBBF}"/>
-          </ac:picMkLst>
-        </pc:picChg>
-        <pc:picChg chg="add mod">
-          <ac:chgData name="Judah Drelich" userId="b58a0b8387fae8c8" providerId="LiveId" clId="{3DDDD3D5-768F-4329-835D-C3D8D568ECA8}" dt="2023-06-08T15:20:44.726" v="3510" actId="14100"/>
-          <ac:picMkLst>
-            <pc:docMk/>
-            <pc:sldMk cId="3990226166" sldId="264"/>
-            <ac:picMk id="21" creationId="{F4B6E064-D66E-2BBB-4257-C95A7D32B972}"/>
-          </ac:picMkLst>
-        </pc:picChg>
-      </pc:sldChg>
-      <pc:sldChg chg="addSp modSp add mod">
-        <pc:chgData name="Judah Drelich" userId="b58a0b8387fae8c8" providerId="LiveId" clId="{3DDDD3D5-768F-4329-835D-C3D8D568ECA8}" dt="2023-06-08T15:21:31.842" v="3517" actId="1076"/>
-        <pc:sldMkLst>
-          <pc:docMk/>
-          <pc:sldMk cId="1558956770" sldId="265"/>
-        </pc:sldMkLst>
-        <pc:spChg chg="add mod">
-          <ac:chgData name="Judah Drelich" userId="b58a0b8387fae8c8" providerId="LiveId" clId="{3DDDD3D5-768F-4329-835D-C3D8D568ECA8}" dt="2023-06-08T15:21:28.941" v="3516" actId="1076"/>
-          <ac:spMkLst>
-            <pc:docMk/>
-            <pc:sldMk cId="1558956770" sldId="265"/>
-            <ac:spMk id="3" creationId="{C9A75A44-9DDD-B14A-5803-5178E631CF25}"/>
-          </ac:spMkLst>
-        </pc:spChg>
-        <pc:spChg chg="add mod">
-          <ac:chgData name="Judah Drelich" userId="b58a0b8387fae8c8" providerId="LiveId" clId="{3DDDD3D5-768F-4329-835D-C3D8D568ECA8}" dt="2023-06-08T10:54:32.269" v="1060" actId="20577"/>
-          <ac:spMkLst>
-            <pc:docMk/>
-            <pc:sldMk cId="1558956770" sldId="265"/>
-            <ac:spMk id="9" creationId="{E66D0282-0C25-279B-3E56-364309BBBEF8}"/>
-          </ac:spMkLst>
-        </pc:spChg>
-        <pc:picChg chg="add mod">
-          <ac:chgData name="Judah Drelich" userId="b58a0b8387fae8c8" providerId="LiveId" clId="{3DDDD3D5-768F-4329-835D-C3D8D568ECA8}" dt="2023-06-08T15:21:31.842" v="3517" actId="1076"/>
-          <ac:picMkLst>
-            <pc:docMk/>
-            <pc:sldMk cId="1558956770" sldId="265"/>
-            <ac:picMk id="6" creationId="{513E9622-D4F2-BDDC-0BF6-AF0CE70A6127}"/>
-          </ac:picMkLst>
-        </pc:picChg>
-        <pc:picChg chg="add mod">
-          <ac:chgData name="Judah Drelich" userId="b58a0b8387fae8c8" providerId="LiveId" clId="{3DDDD3D5-768F-4329-835D-C3D8D568ECA8}" dt="2023-06-08T10:53:15.815" v="1013"/>
-          <ac:picMkLst>
-            <pc:docMk/>
-            <pc:sldMk cId="1558956770" sldId="265"/>
-            <ac:picMk id="7" creationId="{60FC06B8-4595-0555-063E-98266F07C12E}"/>
-          </ac:picMkLst>
-        </pc:picChg>
-      </pc:sldChg>
-      <pc:sldChg chg="addSp delSp modSp add mod">
-        <pc:chgData name="Judah Drelich" userId="b58a0b8387fae8c8" providerId="LiveId" clId="{3DDDD3D5-768F-4329-835D-C3D8D568ECA8}" dt="2023-06-08T15:21:41.697" v="3518" actId="1076"/>
-        <pc:sldMkLst>
-          <pc:docMk/>
-          <pc:sldMk cId="1515107150" sldId="266"/>
-        </pc:sldMkLst>
-        <pc:spChg chg="add mod">
-          <ac:chgData name="Judah Drelich" userId="b58a0b8387fae8c8" providerId="LiveId" clId="{3DDDD3D5-768F-4329-835D-C3D8D568ECA8}" dt="2023-06-08T15:21:41.697" v="3518" actId="1076"/>
-          <ac:spMkLst>
-            <pc:docMk/>
-            <pc:sldMk cId="1515107150" sldId="266"/>
-            <ac:spMk id="3" creationId="{73C0FBD3-81F9-878F-2E32-34DAEB68CA38}"/>
-          </ac:spMkLst>
-        </pc:spChg>
-        <pc:spChg chg="add mod">
-          <ac:chgData name="Judah Drelich" userId="b58a0b8387fae8c8" providerId="LiveId" clId="{3DDDD3D5-768F-4329-835D-C3D8D568ECA8}" dt="2023-06-08T11:49:00.705" v="1661" actId="20577"/>
-          <ac:spMkLst>
-            <pc:docMk/>
-            <pc:sldMk cId="1515107150" sldId="266"/>
-            <ac:spMk id="8" creationId="{8CD37F81-0628-F2A6-2ED2-84D2665585E5}"/>
-          </ac:spMkLst>
-        </pc:spChg>
-        <pc:picChg chg="add del mod">
-          <ac:chgData name="Judah Drelich" userId="b58a0b8387fae8c8" providerId="LiveId" clId="{3DDDD3D5-768F-4329-835D-C3D8D568ECA8}" dt="2023-06-08T11:06:31.106" v="1636" actId="478"/>
-          <ac:picMkLst>
-            <pc:docMk/>
-            <pc:sldMk cId="1515107150" sldId="266"/>
-            <ac:picMk id="6" creationId="{69F7CBBA-D0EF-3086-EFB3-9E8C2B40BEAC}"/>
-          </ac:picMkLst>
-        </pc:picChg>
-        <pc:picChg chg="add mod">
-          <ac:chgData name="Judah Drelich" userId="b58a0b8387fae8c8" providerId="LiveId" clId="{3DDDD3D5-768F-4329-835D-C3D8D568ECA8}" dt="2023-06-08T11:47:15.047" v="1644" actId="1076"/>
-          <ac:picMkLst>
-            <pc:docMk/>
-            <pc:sldMk cId="1515107150" sldId="266"/>
-            <ac:picMk id="9" creationId="{B60A07AC-1ADB-9D54-983B-8CB5B93219C9}"/>
-          </ac:picMkLst>
-        </pc:picChg>
-      </pc:sldChg>
-      <pc:sldChg chg="addSp modSp add mod">
-        <pc:chgData name="Judah Drelich" userId="b58a0b8387fae8c8" providerId="LiveId" clId="{3DDDD3D5-768F-4329-835D-C3D8D568ECA8}" dt="2023-06-08T15:22:54.809" v="3527" actId="20577"/>
-        <pc:sldMkLst>
-          <pc:docMk/>
-          <pc:sldMk cId="2871867152" sldId="267"/>
-        </pc:sldMkLst>
-        <pc:spChg chg="add mod">
-          <ac:chgData name="Judah Drelich" userId="b58a0b8387fae8c8" providerId="LiveId" clId="{3DDDD3D5-768F-4329-835D-C3D8D568ECA8}" dt="2023-06-08T15:22:20.736" v="3520" actId="1076"/>
-          <ac:spMkLst>
-            <pc:docMk/>
-            <pc:sldMk cId="2871867152" sldId="267"/>
-            <ac:spMk id="3" creationId="{73E5D5B1-B74A-E4AE-EFFA-D2C06372753F}"/>
-          </ac:spMkLst>
-        </pc:spChg>
-        <pc:spChg chg="add mod">
-          <ac:chgData name="Judah Drelich" userId="b58a0b8387fae8c8" providerId="LiveId" clId="{3DDDD3D5-768F-4329-835D-C3D8D568ECA8}" dt="2023-06-08T15:22:54.809" v="3527" actId="20577"/>
-          <ac:spMkLst>
-            <pc:docMk/>
-            <pc:sldMk cId="2871867152" sldId="267"/>
-            <ac:spMk id="8" creationId="{1D7AE21D-FD29-207F-69DF-6C6995CE11B8}"/>
-          </ac:spMkLst>
-        </pc:spChg>
-        <pc:spChg chg="add mod">
-          <ac:chgData name="Judah Drelich" userId="b58a0b8387fae8c8" providerId="LiveId" clId="{3DDDD3D5-768F-4329-835D-C3D8D568ECA8}" dt="2023-06-08T15:22:50.626" v="3525" actId="14100"/>
-          <ac:spMkLst>
-            <pc:docMk/>
-            <pc:sldMk cId="2871867152" sldId="267"/>
-            <ac:spMk id="9" creationId="{11F02DCD-90F4-5B8B-9AE6-8DC549867BBD}"/>
-          </ac:spMkLst>
-        </pc:spChg>
-        <pc:picChg chg="add mod">
-          <ac:chgData name="Judah Drelich" userId="b58a0b8387fae8c8" providerId="LiveId" clId="{3DDDD3D5-768F-4329-835D-C3D8D568ECA8}" dt="2023-06-08T15:22:17.170" v="3519" actId="1076"/>
-          <ac:picMkLst>
-            <pc:docMk/>
-            <pc:sldMk cId="2871867152" sldId="267"/>
-            <ac:picMk id="6" creationId="{4A43F9A6-0FDB-39FD-6185-9CA67AADCAB8}"/>
-          </ac:picMkLst>
-        </pc:picChg>
-      </pc:sldChg>
-      <pc:sldChg chg="addSp delSp modSp add mod">
-        <pc:chgData name="Judah Drelich" userId="b58a0b8387fae8c8" providerId="LiveId" clId="{3DDDD3D5-768F-4329-835D-C3D8D568ECA8}" dt="2023-06-08T15:23:49.978" v="3542" actId="1076"/>
-        <pc:sldMkLst>
-          <pc:docMk/>
-          <pc:sldMk cId="540103532" sldId="268"/>
-        </pc:sldMkLst>
-        <pc:spChg chg="add mod">
-          <ac:chgData name="Judah Drelich" userId="b58a0b8387fae8c8" providerId="LiveId" clId="{3DDDD3D5-768F-4329-835D-C3D8D568ECA8}" dt="2023-06-08T15:23:49.978" v="3542" actId="1076"/>
-          <ac:spMkLst>
-            <pc:docMk/>
-            <pc:sldMk cId="540103532" sldId="268"/>
-            <ac:spMk id="7" creationId="{6DCA3E16-D68C-2817-A1B6-F5DD48B2E5B3}"/>
-          </ac:spMkLst>
-        </pc:spChg>
-        <pc:spChg chg="add mod">
-          <ac:chgData name="Judah Drelich" userId="b58a0b8387fae8c8" providerId="LiveId" clId="{3DDDD3D5-768F-4329-835D-C3D8D568ECA8}" dt="2023-06-08T11:58:06.458" v="1921"/>
-          <ac:spMkLst>
-            <pc:docMk/>
-            <pc:sldMk cId="540103532" sldId="268"/>
-            <ac:spMk id="10" creationId="{667D8EC4-F34D-1BAF-4A14-7FC54D35377A}"/>
-          </ac:spMkLst>
-        </pc:spChg>
-        <pc:spChg chg="add del mod">
-          <ac:chgData name="Judah Drelich" userId="b58a0b8387fae8c8" providerId="LiveId" clId="{3DDDD3D5-768F-4329-835D-C3D8D568ECA8}" dt="2023-06-08T11:59:10.442" v="1929" actId="478"/>
-          <ac:spMkLst>
-            <pc:docMk/>
-            <pc:sldMk cId="540103532" sldId="268"/>
-            <ac:spMk id="14" creationId="{531923CF-DD7A-575B-121C-3D990D981B94}"/>
-          </ac:spMkLst>
-        </pc:spChg>
-        <pc:spChg chg="add mod">
-          <ac:chgData name="Judah Drelich" userId="b58a0b8387fae8c8" providerId="LiveId" clId="{3DDDD3D5-768F-4329-835D-C3D8D568ECA8}" dt="2023-06-08T12:00:03.601" v="1937" actId="1076"/>
-          <ac:spMkLst>
-            <pc:docMk/>
-            <pc:sldMk cId="540103532" sldId="268"/>
-            <ac:spMk id="18" creationId="{3BA1E881-5912-9A27-134C-0CE0372B4929}"/>
-          </ac:spMkLst>
-        </pc:spChg>
-        <pc:spChg chg="add mod">
-          <ac:chgData name="Judah Drelich" userId="b58a0b8387fae8c8" providerId="LiveId" clId="{3DDDD3D5-768F-4329-835D-C3D8D568ECA8}" dt="2023-06-08T12:03:08.454" v="2145" actId="20577"/>
-          <ac:spMkLst>
-            <pc:docMk/>
-            <pc:sldMk cId="540103532" sldId="268"/>
-            <ac:spMk id="21" creationId="{7464B7BF-5A61-4448-33D7-F11E22269A4F}"/>
-          </ac:spMkLst>
-        </pc:spChg>
-        <pc:grpChg chg="add mod">
-          <ac:chgData name="Judah Drelich" userId="b58a0b8387fae8c8" providerId="LiveId" clId="{3DDDD3D5-768F-4329-835D-C3D8D568ECA8}" dt="2023-06-08T11:59:58.785" v="1936" actId="14100"/>
-          <ac:grpSpMkLst>
-            <pc:docMk/>
-            <pc:sldMk cId="540103532" sldId="268"/>
-            <ac:grpSpMk id="8" creationId="{D850F05C-E0E0-7065-C115-1C9FDFFC1F95}"/>
-          </ac:grpSpMkLst>
-        </pc:grpChg>
-        <pc:picChg chg="add del mod">
-          <ac:chgData name="Judah Drelich" userId="b58a0b8387fae8c8" providerId="LiveId" clId="{3DDDD3D5-768F-4329-835D-C3D8D568ECA8}" dt="2023-06-08T11:56:57.850" v="1905" actId="478"/>
-          <ac:picMkLst>
-            <pc:docMk/>
-            <pc:sldMk cId="540103532" sldId="268"/>
-            <ac:picMk id="3" creationId="{A9914ED1-22BA-3809-8911-3967F4BBEA6A}"/>
-          </ac:picMkLst>
-        </pc:picChg>
-        <pc:picChg chg="add mod">
-          <ac:chgData name="Judah Drelich" userId="b58a0b8387fae8c8" providerId="LiveId" clId="{3DDDD3D5-768F-4329-835D-C3D8D568ECA8}" dt="2023-06-08T11:58:06.458" v="1921"/>
-          <ac:picMkLst>
-            <pc:docMk/>
-            <pc:sldMk cId="540103532" sldId="268"/>
-            <ac:picMk id="9" creationId="{27D578B2-58DD-0B7A-6F90-9D38820D24F8}"/>
-          </ac:picMkLst>
-        </pc:picChg>
-      </pc:sldChg>
-      <pc:sldChg chg="addSp delSp modSp add mod">
-        <pc:chgData name="Judah Drelich" userId="b58a0b8387fae8c8" providerId="LiveId" clId="{3DDDD3D5-768F-4329-835D-C3D8D568ECA8}" dt="2023-06-08T12:35:21.785" v="2233" actId="20577"/>
-        <pc:sldMkLst>
-          <pc:docMk/>
-          <pc:sldMk cId="1879468217" sldId="269"/>
-        </pc:sldMkLst>
-        <pc:spChg chg="add mod">
-          <ac:chgData name="Judah Drelich" userId="b58a0b8387fae8c8" providerId="LiveId" clId="{3DDDD3D5-768F-4329-835D-C3D8D568ECA8}" dt="2023-06-08T12:28:06.803" v="2154" actId="1076"/>
-          <ac:spMkLst>
-            <pc:docMk/>
-            <pc:sldMk cId="1879468217" sldId="269"/>
-            <ac:spMk id="3" creationId="{EBF61BD9-5A68-1BB9-0DF7-0C0CF8893AC0}"/>
-          </ac:spMkLst>
-        </pc:spChg>
-        <pc:spChg chg="add mod">
-          <ac:chgData name="Judah Drelich" userId="b58a0b8387fae8c8" providerId="LiveId" clId="{3DDDD3D5-768F-4329-835D-C3D8D568ECA8}" dt="2023-06-08T12:35:21.785" v="2233" actId="20577"/>
-          <ac:spMkLst>
-            <pc:docMk/>
-            <pc:sldMk cId="1879468217" sldId="269"/>
-            <ac:spMk id="9" creationId="{B38C8218-735B-CBB8-BADA-694CD1619544}"/>
-          </ac:spMkLst>
-        </pc:spChg>
-        <pc:picChg chg="add mod">
-          <ac:chgData name="Judah Drelich" userId="b58a0b8387fae8c8" providerId="LiveId" clId="{3DDDD3D5-768F-4329-835D-C3D8D568ECA8}" dt="2023-06-08T12:27:56.613" v="2153" actId="1076"/>
-          <ac:picMkLst>
-            <pc:docMk/>
-            <pc:sldMk cId="1879468217" sldId="269"/>
-            <ac:picMk id="6" creationId="{AECF669E-3688-C75D-4DDB-3D5E2D6D2CAE}"/>
-          </ac:picMkLst>
-        </pc:picChg>
-        <pc:picChg chg="add del mod">
-          <ac:chgData name="Judah Drelich" userId="b58a0b8387fae8c8" providerId="LiveId" clId="{3DDDD3D5-768F-4329-835D-C3D8D568ECA8}" dt="2023-06-08T12:28:11.203" v="2156" actId="478"/>
-          <ac:picMkLst>
-            <pc:docMk/>
-            <pc:sldMk cId="1879468217" sldId="269"/>
-            <ac:picMk id="7" creationId="{40D5E974-0ACB-173D-F680-B3C31E5A1A7A}"/>
-          </ac:picMkLst>
-        </pc:picChg>
-      </pc:sldChg>
-      <pc:sldChg chg="add del">
-        <pc:chgData name="Judah Drelich" userId="b58a0b8387fae8c8" providerId="LiveId" clId="{3DDDD3D5-768F-4329-835D-C3D8D568ECA8}" dt="2023-06-08T13:04:54.596" v="2273" actId="47"/>
-        <pc:sldMkLst>
-          <pc:docMk/>
-          <pc:sldMk cId="2374354178" sldId="270"/>
-        </pc:sldMkLst>
-      </pc:sldChg>
-      <pc:sldChg chg="add del">
-        <pc:chgData name="Judah Drelich" userId="b58a0b8387fae8c8" providerId="LiveId" clId="{3DDDD3D5-768F-4329-835D-C3D8D568ECA8}" dt="2023-06-08T13:04:55.997" v="2274" actId="47"/>
-        <pc:sldMkLst>
-          <pc:docMk/>
-          <pc:sldMk cId="4175162349" sldId="271"/>
-        </pc:sldMkLst>
-      </pc:sldChg>
-      <pc:sldChg chg="add del">
-        <pc:chgData name="Judah Drelich" userId="b58a0b8387fae8c8" providerId="LiveId" clId="{3DDDD3D5-768F-4329-835D-C3D8D568ECA8}" dt="2023-06-08T13:04:56.882" v="2275" actId="47"/>
-        <pc:sldMkLst>
-          <pc:docMk/>
-          <pc:sldMk cId="32352078" sldId="272"/>
-        </pc:sldMkLst>
-      </pc:sldChg>
-      <pc:sldChg chg="addSp modSp add mod">
-        <pc:chgData name="Judah Drelich" userId="b58a0b8387fae8c8" providerId="LiveId" clId="{3DDDD3D5-768F-4329-835D-C3D8D568ECA8}" dt="2023-06-08T15:27:05.685" v="3660" actId="1076"/>
-        <pc:sldMkLst>
-          <pc:docMk/>
-          <pc:sldMk cId="2968959200" sldId="273"/>
-        </pc:sldMkLst>
-        <pc:spChg chg="add mod">
-          <ac:chgData name="Judah Drelich" userId="b58a0b8387fae8c8" providerId="LiveId" clId="{3DDDD3D5-768F-4329-835D-C3D8D568ECA8}" dt="2023-06-08T13:11:58.299" v="2479"/>
-          <ac:spMkLst>
-            <pc:docMk/>
-            <pc:sldMk cId="2968959200" sldId="273"/>
-            <ac:spMk id="6" creationId="{8F20969F-6BA1-0D8B-FCD8-0CE80ED996E3}"/>
-          </ac:spMkLst>
-        </pc:spChg>
-        <pc:spChg chg="add mod">
-          <ac:chgData name="Judah Drelich" userId="b58a0b8387fae8c8" providerId="LiveId" clId="{3DDDD3D5-768F-4329-835D-C3D8D568ECA8}" dt="2023-06-08T15:27:05.685" v="3660" actId="1076"/>
-          <ac:spMkLst>
-            <pc:docMk/>
-            <pc:sldMk cId="2968959200" sldId="273"/>
-            <ac:spMk id="8" creationId="{2C5CD001-4B3A-1704-B35C-5B781A4108C3}"/>
-          </ac:spMkLst>
-        </pc:spChg>
-        <pc:spChg chg="add mod">
-          <ac:chgData name="Judah Drelich" userId="b58a0b8387fae8c8" providerId="LiveId" clId="{3DDDD3D5-768F-4329-835D-C3D8D568ECA8}" dt="2023-06-08T13:14:56.240" v="2682" actId="20577"/>
-          <ac:spMkLst>
-            <pc:docMk/>
-            <pc:sldMk cId="2968959200" sldId="273"/>
-            <ac:spMk id="10" creationId="{964C3709-E973-5548-F272-0D277DBE7C7B}"/>
-          </ac:spMkLst>
-        </pc:spChg>
-        <pc:spChg chg="add mod">
-          <ac:chgData name="Judah Drelich" userId="b58a0b8387fae8c8" providerId="LiveId" clId="{3DDDD3D5-768F-4329-835D-C3D8D568ECA8}" dt="2023-06-08T13:14:04.807" v="2569" actId="255"/>
-          <ac:spMkLst>
-            <pc:docMk/>
-            <pc:sldMk cId="2968959200" sldId="273"/>
-            <ac:spMk id="14" creationId="{D13A350D-C235-FFD2-2A73-7309F850FDA3}"/>
-          </ac:spMkLst>
-        </pc:spChg>
-        <pc:grpChg chg="add mod">
-          <ac:chgData name="Judah Drelich" userId="b58a0b8387fae8c8" providerId="LiveId" clId="{3DDDD3D5-768F-4329-835D-C3D8D568ECA8}" dt="2023-06-08T13:13:39.550" v="2566" actId="1076"/>
-          <ac:grpSpMkLst>
-            <pc:docMk/>
-            <pc:sldMk cId="2968959200" sldId="273"/>
-            <ac:grpSpMk id="2" creationId="{A6FA2625-DD42-F073-76F6-7804D1429FF4}"/>
-          </ac:grpSpMkLst>
-        </pc:grpChg>
-        <pc:picChg chg="add mod">
-          <ac:chgData name="Judah Drelich" userId="b58a0b8387fae8c8" providerId="LiveId" clId="{3DDDD3D5-768F-4329-835D-C3D8D568ECA8}" dt="2023-06-08T13:11:58.299" v="2479"/>
-          <ac:picMkLst>
-            <pc:docMk/>
-            <pc:sldMk cId="2968959200" sldId="273"/>
-            <ac:picMk id="3" creationId="{E2FDB683-7D3C-F2A6-E84A-4BB7923D451B}"/>
-          </ac:picMkLst>
-        </pc:picChg>
-      </pc:sldChg>
-      <pc:sldChg chg="add del">
-        <pc:chgData name="Judah Drelich" userId="b58a0b8387fae8c8" providerId="LiveId" clId="{3DDDD3D5-768F-4329-835D-C3D8D568ECA8}" dt="2023-06-08T13:15:19.655" v="2684" actId="47"/>
-        <pc:sldMkLst>
-          <pc:docMk/>
-          <pc:sldMk cId="2705185377" sldId="274"/>
-        </pc:sldMkLst>
-      </pc:sldChg>
-      <pc:sldChg chg="add del">
-        <pc:chgData name="Judah Drelich" userId="b58a0b8387fae8c8" providerId="LiveId" clId="{3DDDD3D5-768F-4329-835D-C3D8D568ECA8}" dt="2023-06-08T13:15:20.520" v="2685" actId="47"/>
-        <pc:sldMkLst>
-          <pc:docMk/>
-          <pc:sldMk cId="889436703" sldId="275"/>
-        </pc:sldMkLst>
-      </pc:sldChg>
-      <pc:sldChg chg="addSp delSp modSp add del mod">
-        <pc:chgData name="Judah Drelich" userId="b58a0b8387fae8c8" providerId="LiveId" clId="{3DDDD3D5-768F-4329-835D-C3D8D568ECA8}" dt="2023-06-08T13:22:23.648" v="2891" actId="47"/>
-        <pc:sldMkLst>
-          <pc:docMk/>
-          <pc:sldMk cId="762568320" sldId="276"/>
-        </pc:sldMkLst>
-        <pc:picChg chg="add del mod">
-          <ac:chgData name="Judah Drelich" userId="b58a0b8387fae8c8" providerId="LiveId" clId="{3DDDD3D5-768F-4329-835D-C3D8D568ECA8}" dt="2023-06-08T13:22:12.751" v="2889" actId="478"/>
-          <ac:picMkLst>
-            <pc:docMk/>
-            <pc:sldMk cId="762568320" sldId="276"/>
-            <ac:picMk id="2" creationId="{1156606F-0497-95D5-21C3-720AA99DC56A}"/>
-          </ac:picMkLst>
-        </pc:picChg>
-      </pc:sldChg>
-      <pc:sldChg chg="addSp delSp modSp add mod">
-        <pc:chgData name="Judah Drelich" userId="b58a0b8387fae8c8" providerId="LiveId" clId="{3DDDD3D5-768F-4329-835D-C3D8D568ECA8}" dt="2023-06-08T15:23:39.912" v="3541" actId="1076"/>
-        <pc:sldMkLst>
-          <pc:docMk/>
-          <pc:sldMk cId="1193397416" sldId="277"/>
-        </pc:sldMkLst>
-        <pc:spChg chg="mod">
-          <ac:chgData name="Judah Drelich" userId="b58a0b8387fae8c8" providerId="LiveId" clId="{3DDDD3D5-768F-4329-835D-C3D8D568ECA8}" dt="2023-06-08T15:23:14.303" v="3529" actId="1076"/>
-          <ac:spMkLst>
-            <pc:docMk/>
-            <pc:sldMk cId="1193397416" sldId="277"/>
-            <ac:spMk id="3" creationId="{73E5D5B1-B74A-E4AE-EFFA-D2C06372753F}"/>
-          </ac:spMkLst>
-        </pc:spChg>
-        <pc:spChg chg="mod">
-          <ac:chgData name="Judah Drelich" userId="b58a0b8387fae8c8" providerId="LiveId" clId="{3DDDD3D5-768F-4329-835D-C3D8D568ECA8}" dt="2023-06-08T15:23:39.912" v="3541" actId="1076"/>
-          <ac:spMkLst>
-            <pc:docMk/>
-            <pc:sldMk cId="1193397416" sldId="277"/>
-            <ac:spMk id="8" creationId="{1D7AE21D-FD29-207F-69DF-6C6995CE11B8}"/>
-          </ac:spMkLst>
-        </pc:spChg>
-        <pc:picChg chg="add mod">
-          <ac:chgData name="Judah Drelich" userId="b58a0b8387fae8c8" providerId="LiveId" clId="{3DDDD3D5-768F-4329-835D-C3D8D568ECA8}" dt="2023-06-08T15:23:09.223" v="3528" actId="1076"/>
-          <ac:picMkLst>
-            <pc:docMk/>
-            <pc:sldMk cId="1193397416" sldId="277"/>
-            <ac:picMk id="2" creationId="{A9F4DAC5-52DC-53CD-619B-668E44DDAB07}"/>
-          </ac:picMkLst>
-        </pc:picChg>
-        <pc:picChg chg="del">
-          <ac:chgData name="Judah Drelich" userId="b58a0b8387fae8c8" providerId="LiveId" clId="{3DDDD3D5-768F-4329-835D-C3D8D568ECA8}" dt="2023-06-08T11:52:34.328" v="1784" actId="478"/>
-          <ac:picMkLst>
-            <pc:docMk/>
-            <pc:sldMk cId="1193397416" sldId="277"/>
-            <ac:picMk id="6" creationId="{4A43F9A6-0FDB-39FD-6185-9CA67AADCAB8}"/>
-          </ac:picMkLst>
-        </pc:picChg>
-      </pc:sldChg>
-      <pc:sldChg chg="addSp delSp modSp add mod">
-        <pc:chgData name="Judah Drelich" userId="b58a0b8387fae8c8" providerId="LiveId" clId="{3DDDD3D5-768F-4329-835D-C3D8D568ECA8}" dt="2023-06-08T15:25:34.448" v="3624" actId="113"/>
-        <pc:sldMkLst>
-          <pc:docMk/>
-          <pc:sldMk cId="536946181" sldId="278"/>
-        </pc:sldMkLst>
-        <pc:spChg chg="mod">
-          <ac:chgData name="Judah Drelich" userId="b58a0b8387fae8c8" providerId="LiveId" clId="{3DDDD3D5-768F-4329-835D-C3D8D568ECA8}" dt="2023-06-08T15:25:34.448" v="3624" actId="113"/>
-          <ac:spMkLst>
-            <pc:docMk/>
-            <pc:sldMk cId="536946181" sldId="278"/>
-            <ac:spMk id="9" creationId="{B38C8218-735B-CBB8-BADA-694CD1619544}"/>
-          </ac:spMkLst>
-        </pc:spChg>
-        <pc:picChg chg="add mod">
-          <ac:chgData name="Judah Drelich" userId="b58a0b8387fae8c8" providerId="LiveId" clId="{3DDDD3D5-768F-4329-835D-C3D8D568ECA8}" dt="2023-06-08T15:24:09.339" v="3543" actId="14100"/>
-          <ac:picMkLst>
-            <pc:docMk/>
-            <pc:sldMk cId="536946181" sldId="278"/>
-            <ac:picMk id="2" creationId="{52B2F737-B99D-8F4B-E55E-0388B829C8DC}"/>
-          </ac:picMkLst>
-        </pc:picChg>
-        <pc:picChg chg="del">
-          <ac:chgData name="Judah Drelich" userId="b58a0b8387fae8c8" providerId="LiveId" clId="{3DDDD3D5-768F-4329-835D-C3D8D568ECA8}" dt="2023-06-08T12:38:06.068" v="2235" actId="478"/>
-          <ac:picMkLst>
-            <pc:docMk/>
-            <pc:sldMk cId="536946181" sldId="278"/>
-            <ac:picMk id="6" creationId="{AECF669E-3688-C75D-4DDB-3D5E2D6D2CAE}"/>
-          </ac:picMkLst>
-        </pc:picChg>
-        <pc:picChg chg="add mod">
-          <ac:chgData name="Judah Drelich" userId="b58a0b8387fae8c8" providerId="LiveId" clId="{3DDDD3D5-768F-4329-835D-C3D8D568ECA8}" dt="2023-06-08T15:24:20.312" v="3546" actId="14100"/>
-          <ac:picMkLst>
-            <pc:docMk/>
-            <pc:sldMk cId="536946181" sldId="278"/>
-            <ac:picMk id="7" creationId="{5B187941-A1F0-35B7-205F-BC26B3BC3915}"/>
-          </ac:picMkLst>
-        </pc:picChg>
-      </pc:sldChg>
-      <pc:sldChg chg="addSp delSp modSp add mod">
-        <pc:chgData name="Judah Drelich" userId="b58a0b8387fae8c8" providerId="LiveId" clId="{3DDDD3D5-768F-4329-835D-C3D8D568ECA8}" dt="2023-06-08T15:26:46.513" v="3659" actId="20577"/>
-        <pc:sldMkLst>
-          <pc:docMk/>
-          <pc:sldMk cId="872216461" sldId="279"/>
-        </pc:sldMkLst>
-        <pc:spChg chg="mod">
-          <ac:chgData name="Judah Drelich" userId="b58a0b8387fae8c8" providerId="LiveId" clId="{3DDDD3D5-768F-4329-835D-C3D8D568ECA8}" dt="2023-06-08T15:26:21.047" v="3629" actId="1076"/>
-          <ac:spMkLst>
-            <pc:docMk/>
-            <pc:sldMk cId="872216461" sldId="279"/>
-            <ac:spMk id="3" creationId="{EBF61BD9-5A68-1BB9-0DF7-0C0CF8893AC0}"/>
-          </ac:spMkLst>
-        </pc:spChg>
-        <pc:spChg chg="add del mod">
-          <ac:chgData name="Judah Drelich" userId="b58a0b8387fae8c8" providerId="LiveId" clId="{3DDDD3D5-768F-4329-835D-C3D8D568ECA8}" dt="2023-06-08T13:06:16.937" v="2286" actId="478"/>
-          <ac:spMkLst>
-            <pc:docMk/>
-            <pc:sldMk cId="872216461" sldId="279"/>
-            <ac:spMk id="8" creationId="{8ED2F840-BBF5-439B-89B7-B3A8326B7A6C}"/>
-          </ac:spMkLst>
-        </pc:spChg>
-        <pc:spChg chg="mod">
-          <ac:chgData name="Judah Drelich" userId="b58a0b8387fae8c8" providerId="LiveId" clId="{3DDDD3D5-768F-4329-835D-C3D8D568ECA8}" dt="2023-06-08T15:26:46.513" v="3659" actId="20577"/>
-          <ac:spMkLst>
-            <pc:docMk/>
-            <pc:sldMk cId="872216461" sldId="279"/>
-            <ac:spMk id="9" creationId="{B38C8218-735B-CBB8-BADA-694CD1619544}"/>
-          </ac:spMkLst>
-        </pc:spChg>
-        <pc:spChg chg="add mod">
-          <ac:chgData name="Judah Drelich" userId="b58a0b8387fae8c8" providerId="LiveId" clId="{3DDDD3D5-768F-4329-835D-C3D8D568ECA8}" dt="2023-06-08T15:26:08.414" v="3627" actId="1076"/>
-          <ac:spMkLst>
-            <pc:docMk/>
-            <pc:sldMk cId="872216461" sldId="279"/>
-            <ac:spMk id="10" creationId="{6AF59883-3C04-538F-F7E4-6D3A2EF8D72D}"/>
-          </ac:spMkLst>
-        </pc:spChg>
-        <pc:spChg chg="add mod">
-          <ac:chgData name="Judah Drelich" userId="b58a0b8387fae8c8" providerId="LiveId" clId="{3DDDD3D5-768F-4329-835D-C3D8D568ECA8}" dt="2023-06-08T15:26:02.834" v="3626" actId="1076"/>
-          <ac:spMkLst>
-            <pc:docMk/>
-            <pc:sldMk cId="872216461" sldId="279"/>
-            <ac:spMk id="12" creationId="{12D9422F-C4E5-256B-ED53-FA667047705C}"/>
-          </ac:spMkLst>
-        </pc:spChg>
-        <pc:picChg chg="del">
-          <ac:chgData name="Judah Drelich" userId="b58a0b8387fae8c8" providerId="LiveId" clId="{3DDDD3D5-768F-4329-835D-C3D8D568ECA8}" dt="2023-06-08T13:05:02.537" v="2276" actId="478"/>
-          <ac:picMkLst>
-            <pc:docMk/>
-            <pc:sldMk cId="872216461" sldId="279"/>
-            <ac:picMk id="2" creationId="{52B2F737-B99D-8F4B-E55E-0388B829C8DC}"/>
-          </ac:picMkLst>
-        </pc:picChg>
-        <pc:picChg chg="add mod">
-          <ac:chgData name="Judah Drelich" userId="b58a0b8387fae8c8" providerId="LiveId" clId="{3DDDD3D5-768F-4329-835D-C3D8D568ECA8}" dt="2023-06-08T15:26:14.529" v="3628" actId="1076"/>
-          <ac:picMkLst>
-            <pc:docMk/>
-            <pc:sldMk cId="872216461" sldId="279"/>
-            <ac:picMk id="6" creationId="{16A7E3DC-CDEA-811B-C04A-70AB50ECB443}"/>
-          </ac:picMkLst>
-        </pc:picChg>
-        <pc:picChg chg="del">
-          <ac:chgData name="Judah Drelich" userId="b58a0b8387fae8c8" providerId="LiveId" clId="{3DDDD3D5-768F-4329-835D-C3D8D568ECA8}" dt="2023-06-08T13:05:05.416" v="2277" actId="478"/>
-          <ac:picMkLst>
-            <pc:docMk/>
-            <pc:sldMk cId="872216461" sldId="279"/>
-            <ac:picMk id="7" creationId="{5B187941-A1F0-35B7-205F-BC26B3BC3915}"/>
-          </ac:picMkLst>
-        </pc:picChg>
-      </pc:sldChg>
-      <pc:sldChg chg="addSp delSp modSp add mod ord">
-        <pc:chgData name="Judah Drelich" userId="b58a0b8387fae8c8" providerId="LiveId" clId="{3DDDD3D5-768F-4329-835D-C3D8D568ECA8}" dt="2023-06-08T13:11:33.656" v="2478" actId="122"/>
-        <pc:sldMkLst>
-          <pc:docMk/>
-          <pc:sldMk cId="3235175584" sldId="280"/>
-        </pc:sldMkLst>
-        <pc:spChg chg="mod">
-          <ac:chgData name="Judah Drelich" userId="b58a0b8387fae8c8" providerId="LiveId" clId="{3DDDD3D5-768F-4329-835D-C3D8D568ECA8}" dt="2023-06-08T13:10:21.323" v="2443" actId="20577"/>
-          <ac:spMkLst>
-            <pc:docMk/>
-            <pc:sldMk cId="3235175584" sldId="280"/>
-            <ac:spMk id="9" creationId="{B38C8218-735B-CBB8-BADA-694CD1619544}"/>
-          </ac:spMkLst>
-        </pc:spChg>
-        <pc:spChg chg="add mod">
-          <ac:chgData name="Judah Drelich" userId="b58a0b8387fae8c8" providerId="LiveId" clId="{3DDDD3D5-768F-4329-835D-C3D8D568ECA8}" dt="2023-06-08T13:11:21.303" v="2474" actId="2711"/>
-          <ac:spMkLst>
-            <pc:docMk/>
-            <pc:sldMk cId="3235175584" sldId="280"/>
-            <ac:spMk id="10" creationId="{ECF473AC-0A6B-4A30-67B5-AD083ECAF533}"/>
-          </ac:spMkLst>
-        </pc:spChg>
-        <pc:spChg chg="add mod">
-          <ac:chgData name="Judah Drelich" userId="b58a0b8387fae8c8" providerId="LiveId" clId="{3DDDD3D5-768F-4329-835D-C3D8D568ECA8}" dt="2023-06-08T13:11:33.656" v="2478" actId="122"/>
-          <ac:spMkLst>
-            <pc:docMk/>
-            <pc:sldMk cId="3235175584" sldId="280"/>
-            <ac:spMk id="12" creationId="{30205DAC-CBC3-2D7E-6216-4B095A7D562F}"/>
-          </ac:spMkLst>
-        </pc:spChg>
-        <pc:picChg chg="del">
-          <ac:chgData name="Judah Drelich" userId="b58a0b8387fae8c8" providerId="LiveId" clId="{3DDDD3D5-768F-4329-835D-C3D8D568ECA8}" dt="2023-06-08T13:08:28.456" v="2384" actId="478"/>
-          <ac:picMkLst>
-            <pc:docMk/>
-            <pc:sldMk cId="3235175584" sldId="280"/>
-            <ac:picMk id="2" creationId="{52B2F737-B99D-8F4B-E55E-0388B829C8DC}"/>
-          </ac:picMkLst>
-        </pc:picChg>
-        <pc:picChg chg="add mod">
-          <ac:chgData name="Judah Drelich" userId="b58a0b8387fae8c8" providerId="LiveId" clId="{3DDDD3D5-768F-4329-835D-C3D8D568ECA8}" dt="2023-06-08T13:09:46.814" v="2393" actId="1076"/>
-          <ac:picMkLst>
-            <pc:docMk/>
-            <pc:sldMk cId="3235175584" sldId="280"/>
-            <ac:picMk id="6" creationId="{15166C81-D80F-7592-06F6-117C3CEA2288}"/>
-          </ac:picMkLst>
-        </pc:picChg>
-        <pc:picChg chg="del">
-          <ac:chgData name="Judah Drelich" userId="b58a0b8387fae8c8" providerId="LiveId" clId="{3DDDD3D5-768F-4329-835D-C3D8D568ECA8}" dt="2023-06-08T13:08:26.402" v="2383" actId="478"/>
-          <ac:picMkLst>
-            <pc:docMk/>
-            <pc:sldMk cId="3235175584" sldId="280"/>
-            <ac:picMk id="7" creationId="{5B187941-A1F0-35B7-205F-BC26B3BC3915}"/>
-          </ac:picMkLst>
-        </pc:picChg>
-        <pc:picChg chg="add mod">
-          <ac:chgData name="Judah Drelich" userId="b58a0b8387fae8c8" providerId="LiveId" clId="{3DDDD3D5-768F-4329-835D-C3D8D568ECA8}" dt="2023-06-08T13:09:52.071" v="2394" actId="1076"/>
-          <ac:picMkLst>
-            <pc:docMk/>
-            <pc:sldMk cId="3235175584" sldId="280"/>
-            <ac:picMk id="8" creationId="{8A1E282B-F9DC-EFBE-008F-57C5038E8F65}"/>
-          </ac:picMkLst>
-        </pc:picChg>
-      </pc:sldChg>
-      <pc:sldChg chg="addSp delSp modSp add mod">
-        <pc:chgData name="Judah Drelich" userId="b58a0b8387fae8c8" providerId="LiveId" clId="{3DDDD3D5-768F-4329-835D-C3D8D568ECA8}" dt="2023-06-08T15:27:16.895" v="3661" actId="1076"/>
-        <pc:sldMkLst>
-          <pc:docMk/>
-          <pc:sldMk cId="355924474" sldId="281"/>
-        </pc:sldMkLst>
-        <pc:spChg chg="mod">
-          <ac:chgData name="Judah Drelich" userId="b58a0b8387fae8c8" providerId="LiveId" clId="{3DDDD3D5-768F-4329-835D-C3D8D568ECA8}" dt="2023-06-08T15:27:16.895" v="3661" actId="1076"/>
-          <ac:spMkLst>
-            <pc:docMk/>
-            <pc:sldMk cId="355924474" sldId="281"/>
-            <ac:spMk id="8" creationId="{2C5CD001-4B3A-1704-B35C-5B781A4108C3}"/>
-          </ac:spMkLst>
-        </pc:spChg>
-        <pc:spChg chg="mod">
-          <ac:chgData name="Judah Drelich" userId="b58a0b8387fae8c8" providerId="LiveId" clId="{3DDDD3D5-768F-4329-835D-C3D8D568ECA8}" dt="2023-06-08T13:18:55.396" v="2795" actId="20577"/>
-          <ac:spMkLst>
-            <pc:docMk/>
-            <pc:sldMk cId="355924474" sldId="281"/>
-            <ac:spMk id="10" creationId="{964C3709-E973-5548-F272-0D277DBE7C7B}"/>
-          </ac:spMkLst>
-        </pc:spChg>
-        <pc:spChg chg="del">
-          <ac:chgData name="Judah Drelich" userId="b58a0b8387fae8c8" providerId="LiveId" clId="{3DDDD3D5-768F-4329-835D-C3D8D568ECA8}" dt="2023-06-08T13:15:30.641" v="2687" actId="478"/>
-          <ac:spMkLst>
-            <pc:docMk/>
-            <pc:sldMk cId="355924474" sldId="281"/>
-            <ac:spMk id="14" creationId="{D13A350D-C235-FFD2-2A73-7309F850FDA3}"/>
-          </ac:spMkLst>
-        </pc:spChg>
-        <pc:grpChg chg="del">
-          <ac:chgData name="Judah Drelich" userId="b58a0b8387fae8c8" providerId="LiveId" clId="{3DDDD3D5-768F-4329-835D-C3D8D568ECA8}" dt="2023-06-08T13:15:23.636" v="2686" actId="478"/>
-          <ac:grpSpMkLst>
-            <pc:docMk/>
-            <pc:sldMk cId="355924474" sldId="281"/>
-            <ac:grpSpMk id="2" creationId="{A6FA2625-DD42-F073-76F6-7804D1429FF4}"/>
-          </ac:grpSpMkLst>
-        </pc:grpChg>
-        <pc:picChg chg="add mod">
-          <ac:chgData name="Judah Drelich" userId="b58a0b8387fae8c8" providerId="LiveId" clId="{3DDDD3D5-768F-4329-835D-C3D8D568ECA8}" dt="2023-06-08T13:17:55.289" v="2750" actId="14100"/>
-          <ac:picMkLst>
-            <pc:docMk/>
-            <pc:sldMk cId="355924474" sldId="281"/>
-            <ac:picMk id="7" creationId="{454D7199-8201-F727-3355-E22586F9E493}"/>
-          </ac:picMkLst>
-        </pc:picChg>
-        <pc:picChg chg="add mod">
-          <ac:chgData name="Judah Drelich" userId="b58a0b8387fae8c8" providerId="LiveId" clId="{3DDDD3D5-768F-4329-835D-C3D8D568ECA8}" dt="2023-06-08T13:17:49.242" v="2749" actId="14100"/>
-          <ac:picMkLst>
-            <pc:docMk/>
-            <pc:sldMk cId="355924474" sldId="281"/>
-            <ac:picMk id="9" creationId="{61FE1CFC-AF4A-8DD9-3279-4CB36A5CFBF4}"/>
-          </ac:picMkLst>
-        </pc:picChg>
-      </pc:sldChg>
-      <pc:sldChg chg="addSp delSp modSp add mod">
-        <pc:chgData name="Judah Drelich" userId="b58a0b8387fae8c8" providerId="LiveId" clId="{3DDDD3D5-768F-4329-835D-C3D8D568ECA8}" dt="2023-06-08T15:27:23.102" v="3662" actId="1076"/>
-        <pc:sldMkLst>
-          <pc:docMk/>
-          <pc:sldMk cId="1764623295" sldId="282"/>
-        </pc:sldMkLst>
-        <pc:spChg chg="mod">
-          <ac:chgData name="Judah Drelich" userId="b58a0b8387fae8c8" providerId="LiveId" clId="{3DDDD3D5-768F-4329-835D-C3D8D568ECA8}" dt="2023-06-08T15:27:23.102" v="3662" actId="1076"/>
-          <ac:spMkLst>
-            <pc:docMk/>
-            <pc:sldMk cId="1764623295" sldId="282"/>
-            <ac:spMk id="8" creationId="{2C5CD001-4B3A-1704-B35C-5B781A4108C3}"/>
-          </ac:spMkLst>
-        </pc:spChg>
-        <pc:spChg chg="mod">
-          <ac:chgData name="Judah Drelich" userId="b58a0b8387fae8c8" providerId="LiveId" clId="{3DDDD3D5-768F-4329-835D-C3D8D568ECA8}" dt="2023-06-08T13:21:41.382" v="2887" actId="20577"/>
-          <ac:spMkLst>
-            <pc:docMk/>
-            <pc:sldMk cId="1764623295" sldId="282"/>
-            <ac:spMk id="10" creationId="{964C3709-E973-5548-F272-0D277DBE7C7B}"/>
-          </ac:spMkLst>
-        </pc:spChg>
-        <pc:picChg chg="add mod">
-          <ac:chgData name="Judah Drelich" userId="b58a0b8387fae8c8" providerId="LiveId" clId="{3DDDD3D5-768F-4329-835D-C3D8D568ECA8}" dt="2023-06-08T13:21:09.311" v="2846" actId="1076"/>
-          <ac:picMkLst>
-            <pc:docMk/>
-            <pc:sldMk cId="1764623295" sldId="282"/>
-            <ac:picMk id="2" creationId="{5266A7E5-E867-A350-A17F-A41FEC747E74}"/>
-          </ac:picMkLst>
-        </pc:picChg>
-        <pc:picChg chg="add mod">
-          <ac:chgData name="Judah Drelich" userId="b58a0b8387fae8c8" providerId="LiveId" clId="{3DDDD3D5-768F-4329-835D-C3D8D568ECA8}" dt="2023-06-08T13:21:29.818" v="2850" actId="14100"/>
-          <ac:picMkLst>
-            <pc:docMk/>
-            <pc:sldMk cId="1764623295" sldId="282"/>
-            <ac:picMk id="3" creationId="{AE4E434C-ADB3-2D04-1100-A0EFBC7DB0AF}"/>
-          </ac:picMkLst>
-        </pc:picChg>
-        <pc:picChg chg="del">
-          <ac:chgData name="Judah Drelich" userId="b58a0b8387fae8c8" providerId="LiveId" clId="{3DDDD3D5-768F-4329-835D-C3D8D568ECA8}" dt="2023-06-08T13:19:07.878" v="2797" actId="478"/>
-          <ac:picMkLst>
-            <pc:docMk/>
-            <pc:sldMk cId="1764623295" sldId="282"/>
-            <ac:picMk id="7" creationId="{454D7199-8201-F727-3355-E22586F9E493}"/>
-          </ac:picMkLst>
-        </pc:picChg>
-        <pc:picChg chg="del">
-          <ac:chgData name="Judah Drelich" userId="b58a0b8387fae8c8" providerId="LiveId" clId="{3DDDD3D5-768F-4329-835D-C3D8D568ECA8}" dt="2023-06-08T13:19:09.884" v="2798" actId="478"/>
-          <ac:picMkLst>
-            <pc:docMk/>
-            <pc:sldMk cId="1764623295" sldId="282"/>
-            <ac:picMk id="9" creationId="{61FE1CFC-AF4A-8DD9-3279-4CB36A5CFBF4}"/>
-          </ac:picMkLst>
-        </pc:picChg>
-      </pc:sldChg>
-      <pc:sldChg chg="addSp delSp modSp add mod">
-        <pc:chgData name="Judah Drelich" userId="b58a0b8387fae8c8" providerId="LiveId" clId="{3DDDD3D5-768F-4329-835D-C3D8D568ECA8}" dt="2023-06-08T15:48:21.616" v="3771" actId="20577"/>
-        <pc:sldMkLst>
-          <pc:docMk/>
-          <pc:sldMk cId="1542200357" sldId="283"/>
-        </pc:sldMkLst>
-        <pc:spChg chg="add mod">
-          <ac:chgData name="Judah Drelich" userId="b58a0b8387fae8c8" providerId="LiveId" clId="{3DDDD3D5-768F-4329-835D-C3D8D568ECA8}" dt="2023-06-08T15:11:40.621" v="3273" actId="20577"/>
-          <ac:spMkLst>
-            <pc:docMk/>
-            <pc:sldMk cId="1542200357" sldId="283"/>
-            <ac:spMk id="7" creationId="{C10BDEA8-2DBF-25B4-3E21-22018D6137FA}"/>
-          </ac:spMkLst>
-        </pc:spChg>
-        <pc:spChg chg="mod">
-          <ac:chgData name="Judah Drelich" userId="b58a0b8387fae8c8" providerId="LiveId" clId="{3DDDD3D5-768F-4329-835D-C3D8D568ECA8}" dt="2023-06-08T15:09:58.853" v="3252" actId="1076"/>
-          <ac:spMkLst>
-            <pc:docMk/>
-            <pc:sldMk cId="1542200357" sldId="283"/>
-            <ac:spMk id="8" creationId="{2C5CD001-4B3A-1704-B35C-5B781A4108C3}"/>
-          </ac:spMkLst>
-        </pc:spChg>
-        <pc:spChg chg="mod">
-          <ac:chgData name="Judah Drelich" userId="b58a0b8387fae8c8" providerId="LiveId" clId="{3DDDD3D5-768F-4329-835D-C3D8D568ECA8}" dt="2023-06-08T15:48:21.616" v="3771" actId="20577"/>
-          <ac:spMkLst>
-            <pc:docMk/>
-            <pc:sldMk cId="1542200357" sldId="283"/>
-            <ac:spMk id="10" creationId="{964C3709-E973-5548-F272-0D277DBE7C7B}"/>
-          </ac:spMkLst>
-        </pc:spChg>
-        <pc:picChg chg="del">
-          <ac:chgData name="Judah Drelich" userId="b58a0b8387fae8c8" providerId="LiveId" clId="{3DDDD3D5-768F-4329-835D-C3D8D568ECA8}" dt="2023-06-08T13:22:29.167" v="2892" actId="478"/>
-          <ac:picMkLst>
-            <pc:docMk/>
-            <pc:sldMk cId="1542200357" sldId="283"/>
-            <ac:picMk id="2" creationId="{5266A7E5-E867-A350-A17F-A41FEC747E74}"/>
-          </ac:picMkLst>
-        </pc:picChg>
-        <pc:picChg chg="del">
-          <ac:chgData name="Judah Drelich" userId="b58a0b8387fae8c8" providerId="LiveId" clId="{3DDDD3D5-768F-4329-835D-C3D8D568ECA8}" dt="2023-06-08T13:22:42.946" v="2913" actId="478"/>
-          <ac:picMkLst>
-            <pc:docMk/>
-            <pc:sldMk cId="1542200357" sldId="283"/>
-            <ac:picMk id="3" creationId="{AE4E434C-ADB3-2D04-1100-A0EFBC7DB0AF}"/>
-          </ac:picMkLst>
-        </pc:picChg>
-      </pc:sldChg>
-    </pc:docChg>
-  </pc:docChgLst>
-</pc:chgInfo>
 </file>
 
 <file path=ppt/notesMasters/notesMaster1.xml><?xml version="1.0" encoding="utf-8"?>
@@ -1779,7 +227,7 @@
           <a:p>
             <a:fld id="{DCFEEEB1-AEB4-4C69-A84A-013D7A72D886}" type="datetimeFigureOut">
               <a:rPr lang="en-US" smtClean="0"/>
-              <a:t>6/7/2023</a:t>
+              <a:t>6/8/2023</a:t>
             </a:fld>
             <a:endParaRPr lang="en-US"/>
           </a:p>
@@ -2277,7 +725,7 @@
           <a:p>
             <a:fld id="{655A5808-3B61-48CC-92EF-85AC2E0DFA56}" type="datetime2">
               <a:rPr lang="en-US" smtClean="0"/>
-              <a:t>Wednesday, June 7, 2023</a:t>
+              <a:t>Thursday, June 8, 2023</a:t>
             </a:fld>
             <a:endParaRPr lang="en-US"/>
           </a:p>
@@ -2475,7 +923,7 @@
           <a:p>
             <a:fld id="{735E98AF-4574-4509-BF7A-519ACD5BF826}" type="datetime2">
               <a:rPr lang="en-US" smtClean="0"/>
-              <a:t>Wednesday, June 7, 2023</a:t>
+              <a:t>Thursday, June 8, 2023</a:t>
             </a:fld>
             <a:endParaRPr lang="en-US"/>
           </a:p>
@@ -2683,7 +1131,7 @@
           <a:p>
             <a:fld id="{93DD97D4-9636-490F-85D0-E926C2B6F3B1}" type="datetime2">
               <a:rPr lang="en-US" smtClean="0"/>
-              <a:t>Wednesday, June 7, 2023</a:t>
+              <a:t>Thursday, June 8, 2023</a:t>
             </a:fld>
             <a:endParaRPr lang="en-US"/>
           </a:p>
@@ -2881,7 +1329,7 @@
           <a:p>
             <a:fld id="{2F3AF3C6-0FD4-4939-991C-00DDE5C56815}" type="datetime2">
               <a:rPr lang="en-US" smtClean="0"/>
-              <a:t>Wednesday, June 7, 2023</a:t>
+              <a:t>Thursday, June 8, 2023</a:t>
             </a:fld>
             <a:endParaRPr lang="en-US"/>
           </a:p>
@@ -3156,7 +1604,7 @@
           <a:p>
             <a:fld id="{86807482-8128-47C6-A8DD-6452B0291CFF}" type="datetime2">
               <a:rPr lang="en-US" smtClean="0"/>
-              <a:t>Wednesday, June 7, 2023</a:t>
+              <a:t>Thursday, June 8, 2023</a:t>
             </a:fld>
             <a:endParaRPr lang="en-US"/>
           </a:p>
@@ -3421,7 +1869,7 @@
           <a:p>
             <a:fld id="{37903F25-275E-41DE-BE3B-EBF0DB49F9B1}" type="datetime2">
               <a:rPr lang="en-US" smtClean="0"/>
-              <a:t>Wednesday, June 7, 2023</a:t>
+              <a:t>Thursday, June 8, 2023</a:t>
             </a:fld>
             <a:endParaRPr lang="en-US"/>
           </a:p>
@@ -3833,7 +2281,7 @@
           <a:p>
             <a:fld id="{EE475572-4A44-4171-84AA-64D42C8050A6}" type="datetime2">
               <a:rPr lang="en-US" smtClean="0"/>
-              <a:t>Wednesday, June 7, 2023</a:t>
+              <a:t>Thursday, June 8, 2023</a:t>
             </a:fld>
             <a:endParaRPr lang="en-US"/>
           </a:p>
@@ -3974,7 +2422,7 @@
           <a:p>
             <a:fld id="{C4C1612E-528E-4FD5-9E9E-E15F1108F171}" type="datetime2">
               <a:rPr lang="en-US" smtClean="0"/>
-              <a:t>Wednesday, June 7, 2023</a:t>
+              <a:t>Thursday, June 8, 2023</a:t>
             </a:fld>
             <a:endParaRPr lang="en-US"/>
           </a:p>
@@ -4087,7 +2535,7 @@
           <a:p>
             <a:fld id="{D4F6D862-A06D-436F-A92E-EBAAD50B6E50}" type="datetime2">
               <a:rPr lang="en-US" smtClean="0"/>
-              <a:t>Wednesday, June 7, 2023</a:t>
+              <a:t>Thursday, June 8, 2023</a:t>
             </a:fld>
             <a:endParaRPr lang="en-US"/>
           </a:p>
@@ -4398,7 +2846,7 @@
           <a:p>
             <a:fld id="{B73E0B7D-2260-4809-8F0A-9E5F3E24F169}" type="datetime2">
               <a:rPr lang="en-US" smtClean="0"/>
-              <a:t>Wednesday, June 7, 2023</a:t>
+              <a:t>Thursday, June 8, 2023</a:t>
             </a:fld>
             <a:endParaRPr lang="en-US"/>
           </a:p>
@@ -4686,7 +3134,7 @@
           <a:p>
             <a:fld id="{3C8E4735-C637-46A3-94EB-AB3AC4188D2F}" type="datetime2">
               <a:rPr lang="en-US" smtClean="0"/>
-              <a:t>Wednesday, June 7, 2023</a:t>
+              <a:t>Thursday, June 8, 2023</a:t>
             </a:fld>
             <a:endParaRPr lang="en-US"/>
           </a:p>
@@ -4928,7 +3376,7 @@
             <a:fld id="{AE0C963C-C1DB-4AFD-9DDC-0691666BF49B}" type="datetime2">
               <a:rPr lang="en-US" smtClean="0"/>
               <a:pPr/>
-              <a:t>Wednesday, June 7, 2023</a:t>
+              <a:t>Thursday, June 8, 2023</a:t>
             </a:fld>
             <a:endParaRPr lang="en-US" cap="all" dirty="0"/>
           </a:p>
@@ -8263,8 +6711,8 @@
           </p:txBody>
         </p:sp>
       </p:grpSp>
-      <mc:AlternateContent xmlns:mc="http://schemas.openxmlformats.org/markup-compatibility/2006">
-        <mc:Choice xmlns:a14="http://schemas.microsoft.com/office/drawing/2010/main" Requires="a14">
+      <mc:AlternateContent xmlns:mc="http://schemas.openxmlformats.org/markup-compatibility/2006" xmlns:a14="http://schemas.microsoft.com/office/drawing/2010/main">
+        <mc:Choice Requires="a14">
           <p:sp>
             <p:nvSpPr>
               <p:cNvPr id="18" name="TextBox 17">
@@ -8467,7 +6915,7 @@
             </p:txBody>
           </p:sp>
         </mc:Choice>
-        <mc:Fallback>
+        <mc:Fallback xmlns="">
           <p:sp>
             <p:nvSpPr>
               <p:cNvPr id="18" name="TextBox 17">
@@ -12652,8 +11100,8 @@
           </a:p>
         </p:txBody>
       </p:sp>
-      <mc:AlternateContent xmlns:mc="http://schemas.openxmlformats.org/markup-compatibility/2006">
-        <mc:Choice xmlns:a14="http://schemas.microsoft.com/office/drawing/2010/main" Requires="a14">
+      <mc:AlternateContent xmlns:mc="http://schemas.openxmlformats.org/markup-compatibility/2006" xmlns:a14="http://schemas.microsoft.com/office/drawing/2010/main">
+        <mc:Choice Requires="a14">
           <p:sp>
             <p:nvSpPr>
               <p:cNvPr id="14" name="TextBox 13">
@@ -12825,7 +11273,7 @@
             </p:txBody>
           </p:sp>
         </mc:Choice>
-        <mc:Fallback>
+        <mc:Fallback xmlns="">
           <p:sp>
             <p:nvSpPr>
               <p:cNvPr id="14" name="TextBox 13">
@@ -19116,8 +17564,8 @@
           </a:p>
         </p:txBody>
       </p:sp>
-      <mc:AlternateContent xmlns:mc="http://schemas.openxmlformats.org/markup-compatibility/2006">
-        <mc:Choice xmlns:a14="http://schemas.microsoft.com/office/drawing/2010/main" Requires="a14">
+      <mc:AlternateContent xmlns:mc="http://schemas.openxmlformats.org/markup-compatibility/2006" xmlns:a14="http://schemas.microsoft.com/office/drawing/2010/main">
+        <mc:Choice Requires="a14">
           <p:sp>
             <p:nvSpPr>
               <p:cNvPr id="2" name="TextBox 1">
@@ -19183,6 +17631,7 @@
                 </a:endParaRPr>
               </a:p>
               <a:p>
+                <a:pPr/>
                 <a14:m>
                   <m:oMathPara xmlns:m="http://schemas.openxmlformats.org/officeDocument/2006/math">
                     <m:oMathParaPr>
@@ -19467,7 +17916,7 @@
             </p:txBody>
           </p:sp>
         </mc:Choice>
-        <mc:Fallback>
+        <mc:Fallback xmlns="">
           <p:sp>
             <p:nvSpPr>
               <p:cNvPr id="2" name="TextBox 1">

</xml_diff>